<commit_message>
Agregue referencia al proyecto
</commit_message>
<xml_diff>
--- a/PROYECTO-MACHINE-LEARNING.pptx
+++ b/PROYECTO-MACHINE-LEARNING.pptx
@@ -180,7 +180,7 @@
           <a:noFill/>
           <a:extLst>
             <a:ext uri="{909E8E84-426E-40dd-AFC4-6F175D3DCCD1}">
-              <a14:hiddenFill xmlns:a14="http://schemas.microsoft.com/office/drawing/2010/main" xmlns="">
+              <a14:hiddenFill xmlns="" xmlns:a14="http://schemas.microsoft.com/office/drawing/2010/main">
                 <a:solidFill>
                   <a:srgbClr val="FFFFFF"/>
                 </a:solidFill>
@@ -239,7 +239,7 @@
             </a:ln>
             <a:extLst>
               <a:ext uri="{91240B29-F687-4f45-9708-019B960494DF}">
-                <a14:hiddenLine xmlns:a14="http://schemas.microsoft.com/office/drawing/2010/main" xmlns="" w="9525">
+                <a14:hiddenLine xmlns="" xmlns:a14="http://schemas.microsoft.com/office/drawing/2010/main" w="9525">
                   <a:solidFill>
                     <a:srgbClr val="000000"/>
                   </a:solidFill>
@@ -329,7 +329,7 @@
             </a:ln>
             <a:extLst>
               <a:ext uri="{91240B29-F687-4f45-9708-019B960494DF}">
-                <a14:hiddenLine xmlns:a14="http://schemas.microsoft.com/office/drawing/2010/main" xmlns="" w="9525">
+                <a14:hiddenLine xmlns="" xmlns:a14="http://schemas.microsoft.com/office/drawing/2010/main" w="9525">
                   <a:solidFill>
                     <a:srgbClr val="000000"/>
                   </a:solidFill>
@@ -419,7 +419,7 @@
             </a:ln>
             <a:extLst>
               <a:ext uri="{91240B29-F687-4f45-9708-019B960494DF}">
-                <a14:hiddenLine xmlns:a14="http://schemas.microsoft.com/office/drawing/2010/main" xmlns="" w="9525">
+                <a14:hiddenLine xmlns="" xmlns:a14="http://schemas.microsoft.com/office/drawing/2010/main" w="9525">
                   <a:solidFill>
                     <a:srgbClr val="000000"/>
                   </a:solidFill>
@@ -453,7 +453,7 @@
             </a:ln>
             <a:extLst>
               <a:ext uri="{91240B29-F687-4f45-9708-019B960494DF}">
-                <a14:hiddenLine xmlns:a14="http://schemas.microsoft.com/office/drawing/2010/main" xmlns="" w="9525">
+                <a14:hiddenLine xmlns="" xmlns:a14="http://schemas.microsoft.com/office/drawing/2010/main" w="9525">
                   <a:solidFill>
                     <a:srgbClr val="000000"/>
                   </a:solidFill>
@@ -543,7 +543,7 @@
             </a:ln>
             <a:extLst>
               <a:ext uri="{91240B29-F687-4f45-9708-019B960494DF}">
-                <a14:hiddenLine xmlns:a14="http://schemas.microsoft.com/office/drawing/2010/main" xmlns="" w="9525">
+                <a14:hiddenLine xmlns="" xmlns:a14="http://schemas.microsoft.com/office/drawing/2010/main" w="9525">
                   <a:solidFill>
                     <a:srgbClr val="000000"/>
                   </a:solidFill>
@@ -605,7 +605,7 @@
             </a:ln>
             <a:extLst>
               <a:ext uri="{91240B29-F687-4f45-9708-019B960494DF}">
-                <a14:hiddenLine xmlns:a14="http://schemas.microsoft.com/office/drawing/2010/main" xmlns="" w="9525">
+                <a14:hiddenLine xmlns="" xmlns:a14="http://schemas.microsoft.com/office/drawing/2010/main" w="9525">
                   <a:solidFill>
                     <a:srgbClr val="000000"/>
                   </a:solidFill>
@@ -667,7 +667,7 @@
             </a:ln>
             <a:extLst>
               <a:ext uri="{91240B29-F687-4f45-9708-019B960494DF}">
-                <a14:hiddenLine xmlns:a14="http://schemas.microsoft.com/office/drawing/2010/main" xmlns="" w="9525">
+                <a14:hiddenLine xmlns="" xmlns:a14="http://schemas.microsoft.com/office/drawing/2010/main" w="9525">
                   <a:solidFill>
                     <a:srgbClr val="000000"/>
                   </a:solidFill>
@@ -757,7 +757,7 @@
             </a:ln>
             <a:extLst>
               <a:ext uri="{91240B29-F687-4f45-9708-019B960494DF}">
-                <a14:hiddenLine xmlns:a14="http://schemas.microsoft.com/office/drawing/2010/main" xmlns="" w="9525">
+                <a14:hiddenLine xmlns="" xmlns:a14="http://schemas.microsoft.com/office/drawing/2010/main" w="9525">
                   <a:solidFill>
                     <a:srgbClr val="000000"/>
                   </a:solidFill>
@@ -819,7 +819,7 @@
             </a:ln>
             <a:extLst>
               <a:ext uri="{91240B29-F687-4f45-9708-019B960494DF}">
-                <a14:hiddenLine xmlns:a14="http://schemas.microsoft.com/office/drawing/2010/main" xmlns="" w="9525">
+                <a14:hiddenLine xmlns="" xmlns:a14="http://schemas.microsoft.com/office/drawing/2010/main" w="9525">
                   <a:solidFill>
                     <a:srgbClr val="000000"/>
                   </a:solidFill>
@@ -881,7 +881,7 @@
             </a:ln>
             <a:extLst>
               <a:ext uri="{91240B29-F687-4f45-9708-019B960494DF}">
-                <a14:hiddenLine xmlns:a14="http://schemas.microsoft.com/office/drawing/2010/main" xmlns="" w="9525">
+                <a14:hiddenLine xmlns="" xmlns:a14="http://schemas.microsoft.com/office/drawing/2010/main" w="9525">
                   <a:solidFill>
                     <a:srgbClr val="000000"/>
                   </a:solidFill>
@@ -971,7 +971,7 @@
             </a:ln>
             <a:extLst>
               <a:ext uri="{91240B29-F687-4f45-9708-019B960494DF}">
-                <a14:hiddenLine xmlns:a14="http://schemas.microsoft.com/office/drawing/2010/main" xmlns="" w="9525">
+                <a14:hiddenLine xmlns="" xmlns:a14="http://schemas.microsoft.com/office/drawing/2010/main" w="9525">
                   <a:solidFill>
                     <a:srgbClr val="000000"/>
                   </a:solidFill>
@@ -1061,7 +1061,7 @@
             </a:ln>
             <a:extLst>
               <a:ext uri="{91240B29-F687-4f45-9708-019B960494DF}">
-                <a14:hiddenLine xmlns:a14="http://schemas.microsoft.com/office/drawing/2010/main" xmlns="" w="9525">
+                <a14:hiddenLine xmlns="" xmlns:a14="http://schemas.microsoft.com/office/drawing/2010/main" w="9525">
                   <a:solidFill>
                     <a:srgbClr val="000000"/>
                   </a:solidFill>
@@ -1123,7 +1123,7 @@
             </a:ln>
             <a:extLst>
               <a:ext uri="{91240B29-F687-4f45-9708-019B960494DF}">
-                <a14:hiddenLine xmlns:a14="http://schemas.microsoft.com/office/drawing/2010/main" xmlns="" w="9525">
+                <a14:hiddenLine xmlns="" xmlns:a14="http://schemas.microsoft.com/office/drawing/2010/main" w="9525">
                   <a:solidFill>
                     <a:srgbClr val="000000"/>
                   </a:solidFill>
@@ -1233,7 +1233,7 @@
             </a:ln>
             <a:extLst>
               <a:ext uri="{91240B29-F687-4f45-9708-019B960494DF}">
-                <a14:hiddenLine xmlns:a14="http://schemas.microsoft.com/office/drawing/2010/main" xmlns="" w="9525">
+                <a14:hiddenLine xmlns="" xmlns:a14="http://schemas.microsoft.com/office/drawing/2010/main" w="9525">
                   <a:solidFill>
                     <a:srgbClr val="000000"/>
                   </a:solidFill>
@@ -1295,7 +1295,7 @@
             </a:ln>
             <a:extLst>
               <a:ext uri="{91240B29-F687-4f45-9708-019B960494DF}">
-                <a14:hiddenLine xmlns:a14="http://schemas.microsoft.com/office/drawing/2010/main" xmlns="" w="9525">
+                <a14:hiddenLine xmlns="" xmlns:a14="http://schemas.microsoft.com/office/drawing/2010/main" w="9525">
                   <a:solidFill>
                     <a:srgbClr val="000000"/>
                   </a:solidFill>
@@ -1385,7 +1385,7 @@
             </a:ln>
             <a:extLst>
               <a:ext uri="{91240B29-F687-4f45-9708-019B960494DF}">
-                <a14:hiddenLine xmlns:a14="http://schemas.microsoft.com/office/drawing/2010/main" xmlns="" w="9525">
+                <a14:hiddenLine xmlns="" xmlns:a14="http://schemas.microsoft.com/office/drawing/2010/main" w="9525">
                   <a:solidFill>
                     <a:srgbClr val="000000"/>
                   </a:solidFill>
@@ -1475,7 +1475,7 @@
             </a:ln>
             <a:extLst>
               <a:ext uri="{91240B29-F687-4f45-9708-019B960494DF}">
-                <a14:hiddenLine xmlns:a14="http://schemas.microsoft.com/office/drawing/2010/main" xmlns="" w="9525">
+                <a14:hiddenLine xmlns="" xmlns:a14="http://schemas.microsoft.com/office/drawing/2010/main" w="9525">
                   <a:solidFill>
                     <a:srgbClr val="000000"/>
                   </a:solidFill>
@@ -1537,7 +1537,7 @@
             </a:ln>
             <a:extLst>
               <a:ext uri="{91240B29-F687-4f45-9708-019B960494DF}">
-                <a14:hiddenLine xmlns:a14="http://schemas.microsoft.com/office/drawing/2010/main" xmlns="" w="9525">
+                <a14:hiddenLine xmlns="" xmlns:a14="http://schemas.microsoft.com/office/drawing/2010/main" w="9525">
                   <a:solidFill>
                     <a:srgbClr val="000000"/>
                   </a:solidFill>
@@ -1627,7 +1627,7 @@
             </a:ln>
             <a:extLst>
               <a:ext uri="{91240B29-F687-4f45-9708-019B960494DF}">
-                <a14:hiddenLine xmlns:a14="http://schemas.microsoft.com/office/drawing/2010/main" xmlns="" w="9525">
+                <a14:hiddenLine xmlns="" xmlns:a14="http://schemas.microsoft.com/office/drawing/2010/main" w="9525">
                   <a:solidFill>
                     <a:srgbClr val="000000"/>
                   </a:solidFill>
@@ -1717,7 +1717,7 @@
             </a:ln>
             <a:extLst>
               <a:ext uri="{91240B29-F687-4f45-9708-019B960494DF}">
-                <a14:hiddenLine xmlns:a14="http://schemas.microsoft.com/office/drawing/2010/main" xmlns="" w="9525">
+                <a14:hiddenLine xmlns="" xmlns:a14="http://schemas.microsoft.com/office/drawing/2010/main" w="9525">
                   <a:solidFill>
                     <a:srgbClr val="000000"/>
                   </a:solidFill>
@@ -1773,7 +1773,7 @@
             </a:ln>
             <a:extLst>
               <a:ext uri="{91240B29-F687-4f45-9708-019B960494DF}">
-                <a14:hiddenLine xmlns:a14="http://schemas.microsoft.com/office/drawing/2010/main" xmlns="" w="9525">
+                <a14:hiddenLine xmlns="" xmlns:a14="http://schemas.microsoft.com/office/drawing/2010/main" w="9525">
                   <a:solidFill>
                     <a:srgbClr val="000000"/>
                   </a:solidFill>
@@ -1863,7 +1863,7 @@
             </a:ln>
             <a:extLst>
               <a:ext uri="{91240B29-F687-4f45-9708-019B960494DF}">
-                <a14:hiddenLine xmlns:a14="http://schemas.microsoft.com/office/drawing/2010/main" xmlns="" w="9525">
+                <a14:hiddenLine xmlns="" xmlns:a14="http://schemas.microsoft.com/office/drawing/2010/main" w="9525">
                   <a:solidFill>
                     <a:srgbClr val="000000"/>
                   </a:solidFill>
@@ -1919,7 +1919,7 @@
             </a:ln>
             <a:extLst>
               <a:ext uri="{91240B29-F687-4f45-9708-019B960494DF}">
-                <a14:hiddenLine xmlns:a14="http://schemas.microsoft.com/office/drawing/2010/main" xmlns="" w="9525">
+                <a14:hiddenLine xmlns="" xmlns:a14="http://schemas.microsoft.com/office/drawing/2010/main" w="9525">
                   <a:solidFill>
                     <a:srgbClr val="000000"/>
                   </a:solidFill>
@@ -2009,7 +2009,7 @@
             </a:ln>
             <a:extLst>
               <a:ext uri="{91240B29-F687-4f45-9708-019B960494DF}">
-                <a14:hiddenLine xmlns:a14="http://schemas.microsoft.com/office/drawing/2010/main" xmlns="" w="9525">
+                <a14:hiddenLine xmlns="" xmlns:a14="http://schemas.microsoft.com/office/drawing/2010/main" w="9525">
                   <a:solidFill>
                     <a:srgbClr val="000000"/>
                   </a:solidFill>
@@ -2077,7 +2077,7 @@
             </a:ln>
             <a:extLst>
               <a:ext uri="{91240B29-F687-4f45-9708-019B960494DF}">
-                <a14:hiddenLine xmlns:a14="http://schemas.microsoft.com/office/drawing/2010/main" xmlns="" w="9525">
+                <a14:hiddenLine xmlns="" xmlns:a14="http://schemas.microsoft.com/office/drawing/2010/main" w="9525">
                   <a:solidFill>
                     <a:srgbClr val="000000"/>
                   </a:solidFill>
@@ -2167,7 +2167,7 @@
             </a:ln>
             <a:extLst>
               <a:ext uri="{91240B29-F687-4f45-9708-019B960494DF}">
-                <a14:hiddenLine xmlns:a14="http://schemas.microsoft.com/office/drawing/2010/main" xmlns="" w="9525">
+                <a14:hiddenLine xmlns="" xmlns:a14="http://schemas.microsoft.com/office/drawing/2010/main" w="9525">
                   <a:solidFill>
                     <a:srgbClr val="000000"/>
                   </a:solidFill>
@@ -2235,7 +2235,7 @@
             </a:ln>
             <a:extLst>
               <a:ext uri="{91240B29-F687-4f45-9708-019B960494DF}">
-                <a14:hiddenLine xmlns:a14="http://schemas.microsoft.com/office/drawing/2010/main" xmlns="" w="9525">
+                <a14:hiddenLine xmlns="" xmlns:a14="http://schemas.microsoft.com/office/drawing/2010/main" w="9525">
                   <a:solidFill>
                     <a:srgbClr val="000000"/>
                   </a:solidFill>
@@ -2325,7 +2325,7 @@
             </a:ln>
             <a:extLst>
               <a:ext uri="{91240B29-F687-4f45-9708-019B960494DF}">
-                <a14:hiddenLine xmlns:a14="http://schemas.microsoft.com/office/drawing/2010/main" xmlns="" w="9525">
+                <a14:hiddenLine xmlns="" xmlns:a14="http://schemas.microsoft.com/office/drawing/2010/main" w="9525">
                   <a:solidFill>
                     <a:srgbClr val="000000"/>
                   </a:solidFill>
@@ -2359,7 +2359,7 @@
             </a:ln>
             <a:extLst>
               <a:ext uri="{91240B29-F687-4f45-9708-019B960494DF}">
-                <a14:hiddenLine xmlns:a14="http://schemas.microsoft.com/office/drawing/2010/main" xmlns="" w="9525">
+                <a14:hiddenLine xmlns="" xmlns:a14="http://schemas.microsoft.com/office/drawing/2010/main" w="9525">
                   <a:solidFill>
                     <a:srgbClr val="000000"/>
                   </a:solidFill>
@@ -2449,7 +2449,7 @@
             </a:ln>
             <a:extLst>
               <a:ext uri="{91240B29-F687-4f45-9708-019B960494DF}">
-                <a14:hiddenLine xmlns:a14="http://schemas.microsoft.com/office/drawing/2010/main" xmlns="" w="9525">
+                <a14:hiddenLine xmlns="" xmlns:a14="http://schemas.microsoft.com/office/drawing/2010/main" w="9525">
                   <a:solidFill>
                     <a:srgbClr val="000000"/>
                   </a:solidFill>
@@ -2511,7 +2511,7 @@
             </a:ln>
             <a:extLst>
               <a:ext uri="{91240B29-F687-4f45-9708-019B960494DF}">
-                <a14:hiddenLine xmlns:a14="http://schemas.microsoft.com/office/drawing/2010/main" xmlns="" w="9525">
+                <a14:hiddenLine xmlns="" xmlns:a14="http://schemas.microsoft.com/office/drawing/2010/main" w="9525">
                   <a:solidFill>
                     <a:srgbClr val="000000"/>
                   </a:solidFill>
@@ -2573,7 +2573,7 @@
             </a:ln>
             <a:extLst>
               <a:ext uri="{91240B29-F687-4f45-9708-019B960494DF}">
-                <a14:hiddenLine xmlns:a14="http://schemas.microsoft.com/office/drawing/2010/main" xmlns="" w="9525">
+                <a14:hiddenLine xmlns="" xmlns:a14="http://schemas.microsoft.com/office/drawing/2010/main" w="9525">
                   <a:solidFill>
                     <a:srgbClr val="000000"/>
                   </a:solidFill>
@@ -2663,7 +2663,7 @@
             </a:ln>
             <a:extLst>
               <a:ext uri="{91240B29-F687-4f45-9708-019B960494DF}">
-                <a14:hiddenLine xmlns:a14="http://schemas.microsoft.com/office/drawing/2010/main" xmlns="" w="9525">
+                <a14:hiddenLine xmlns="" xmlns:a14="http://schemas.microsoft.com/office/drawing/2010/main" w="9525">
                   <a:solidFill>
                     <a:srgbClr val="000000"/>
                   </a:solidFill>
@@ -2731,7 +2731,7 @@
             </a:ln>
             <a:extLst>
               <a:ext uri="{91240B29-F687-4f45-9708-019B960494DF}">
-                <a14:hiddenLine xmlns:a14="http://schemas.microsoft.com/office/drawing/2010/main" xmlns="" w="9525">
+                <a14:hiddenLine xmlns="" xmlns:a14="http://schemas.microsoft.com/office/drawing/2010/main" w="9525">
                   <a:solidFill>
                     <a:srgbClr val="000000"/>
                   </a:solidFill>
@@ -2793,7 +2793,7 @@
             </a:ln>
             <a:extLst>
               <a:ext uri="{91240B29-F687-4f45-9708-019B960494DF}">
-                <a14:hiddenLine xmlns:a14="http://schemas.microsoft.com/office/drawing/2010/main" xmlns="" w="9525">
+                <a14:hiddenLine xmlns="" xmlns:a14="http://schemas.microsoft.com/office/drawing/2010/main" w="9525">
                   <a:solidFill>
                     <a:srgbClr val="000000"/>
                   </a:solidFill>
@@ -2883,7 +2883,7 @@
             </a:ln>
             <a:extLst>
               <a:ext uri="{91240B29-F687-4f45-9708-019B960494DF}">
-                <a14:hiddenLine xmlns:a14="http://schemas.microsoft.com/office/drawing/2010/main" xmlns="" w="9525">
+                <a14:hiddenLine xmlns="" xmlns:a14="http://schemas.microsoft.com/office/drawing/2010/main" w="9525">
                   <a:solidFill>
                     <a:srgbClr val="000000"/>
                   </a:solidFill>
@@ -2945,7 +2945,7 @@
             </a:ln>
             <a:extLst>
               <a:ext uri="{91240B29-F687-4f45-9708-019B960494DF}">
-                <a14:hiddenLine xmlns:a14="http://schemas.microsoft.com/office/drawing/2010/main" xmlns="" w="9525">
+                <a14:hiddenLine xmlns="" xmlns:a14="http://schemas.microsoft.com/office/drawing/2010/main" w="9525">
                   <a:solidFill>
                     <a:srgbClr val="000000"/>
                   </a:solidFill>
@@ -3035,7 +3035,7 @@
             </a:ln>
             <a:extLst>
               <a:ext uri="{91240B29-F687-4f45-9708-019B960494DF}">
-                <a14:hiddenLine xmlns:a14="http://schemas.microsoft.com/office/drawing/2010/main" xmlns="" w="9525">
+                <a14:hiddenLine xmlns="" xmlns:a14="http://schemas.microsoft.com/office/drawing/2010/main" w="9525">
                   <a:solidFill>
                     <a:srgbClr val="000000"/>
                   </a:solidFill>
@@ -3097,7 +3097,7 @@
             </a:ln>
             <a:extLst>
               <a:ext uri="{91240B29-F687-4f45-9708-019B960494DF}">
-                <a14:hiddenLine xmlns:a14="http://schemas.microsoft.com/office/drawing/2010/main" xmlns="" w="9525">
+                <a14:hiddenLine xmlns="" xmlns:a14="http://schemas.microsoft.com/office/drawing/2010/main" w="9525">
                   <a:solidFill>
                     <a:srgbClr val="000000"/>
                   </a:solidFill>
@@ -3187,7 +3187,7 @@
             </a:ln>
             <a:extLst>
               <a:ext uri="{91240B29-F687-4f45-9708-019B960494DF}">
-                <a14:hiddenLine xmlns:a14="http://schemas.microsoft.com/office/drawing/2010/main" xmlns="" w="9525">
+                <a14:hiddenLine xmlns="" xmlns:a14="http://schemas.microsoft.com/office/drawing/2010/main" w="9525">
                   <a:solidFill>
                     <a:srgbClr val="000000"/>
                   </a:solidFill>
@@ -3221,7 +3221,7 @@
             </a:ln>
             <a:extLst>
               <a:ext uri="{91240B29-F687-4f45-9708-019B960494DF}">
-                <a14:hiddenLine xmlns:a14="http://schemas.microsoft.com/office/drawing/2010/main" xmlns="" w="9525">
+                <a14:hiddenLine xmlns="" xmlns:a14="http://schemas.microsoft.com/office/drawing/2010/main" w="9525">
                   <a:solidFill>
                     <a:srgbClr val="000000"/>
                   </a:solidFill>
@@ -3286,7 +3286,7 @@
             </a:ln>
             <a:extLst>
               <a:ext uri="{91240B29-F687-4f45-9708-019B960494DF}">
-                <a14:hiddenLine xmlns:a14="http://schemas.microsoft.com/office/drawing/2010/main" xmlns="" w="9525">
+                <a14:hiddenLine xmlns="" xmlns:a14="http://schemas.microsoft.com/office/drawing/2010/main" w="9525">
                   <a:solidFill>
                     <a:srgbClr val="000000"/>
                   </a:solidFill>
@@ -3376,7 +3376,7 @@
             </a:ln>
             <a:extLst>
               <a:ext uri="{91240B29-F687-4f45-9708-019B960494DF}">
-                <a14:hiddenLine xmlns:a14="http://schemas.microsoft.com/office/drawing/2010/main" xmlns="" w="9525">
+                <a14:hiddenLine xmlns="" xmlns:a14="http://schemas.microsoft.com/office/drawing/2010/main" w="9525">
                   <a:solidFill>
                     <a:srgbClr val="000000"/>
                   </a:solidFill>
@@ -3438,7 +3438,7 @@
             </a:ln>
             <a:extLst>
               <a:ext uri="{91240B29-F687-4f45-9708-019B960494DF}">
-                <a14:hiddenLine xmlns:a14="http://schemas.microsoft.com/office/drawing/2010/main" xmlns="" w="9525">
+                <a14:hiddenLine xmlns="" xmlns:a14="http://schemas.microsoft.com/office/drawing/2010/main" w="9525">
                   <a:solidFill>
                     <a:srgbClr val="000000"/>
                   </a:solidFill>
@@ -3528,7 +3528,7 @@
             </a:ln>
             <a:extLst>
               <a:ext uri="{91240B29-F687-4f45-9708-019B960494DF}">
-                <a14:hiddenLine xmlns:a14="http://schemas.microsoft.com/office/drawing/2010/main" xmlns="" w="9525">
+                <a14:hiddenLine xmlns="" xmlns:a14="http://schemas.microsoft.com/office/drawing/2010/main" w="9525">
                   <a:solidFill>
                     <a:srgbClr val="000000"/>
                   </a:solidFill>
@@ -3618,7 +3618,7 @@
             </a:ln>
             <a:extLst>
               <a:ext uri="{91240B29-F687-4f45-9708-019B960494DF}">
-                <a14:hiddenLine xmlns:a14="http://schemas.microsoft.com/office/drawing/2010/main" xmlns="" w="9525">
+                <a14:hiddenLine xmlns="" xmlns:a14="http://schemas.microsoft.com/office/drawing/2010/main" w="9525">
                   <a:solidFill>
                     <a:srgbClr val="000000"/>
                   </a:solidFill>
@@ -3683,7 +3683,7 @@
             </a:ln>
             <a:extLst>
               <a:ext uri="{91240B29-F687-4f45-9708-019B960494DF}">
-                <a14:hiddenLine xmlns:a14="http://schemas.microsoft.com/office/drawing/2010/main" xmlns="" w="9525">
+                <a14:hiddenLine xmlns="" xmlns:a14="http://schemas.microsoft.com/office/drawing/2010/main" w="9525">
                   <a:solidFill>
                     <a:srgbClr val="000000"/>
                   </a:solidFill>
@@ -3745,7 +3745,7 @@
             </a:ln>
             <a:extLst>
               <a:ext uri="{91240B29-F687-4f45-9708-019B960494DF}">
-                <a14:hiddenLine xmlns:a14="http://schemas.microsoft.com/office/drawing/2010/main" xmlns="" w="9525">
+                <a14:hiddenLine xmlns="" xmlns:a14="http://schemas.microsoft.com/office/drawing/2010/main" w="9525">
                   <a:solidFill>
                     <a:srgbClr val="000000"/>
                   </a:solidFill>
@@ -3835,7 +3835,7 @@
             </a:ln>
             <a:extLst>
               <a:ext uri="{91240B29-F687-4f45-9708-019B960494DF}">
-                <a14:hiddenLine xmlns:a14="http://schemas.microsoft.com/office/drawing/2010/main" xmlns="" w="9525">
+                <a14:hiddenLine xmlns="" xmlns:a14="http://schemas.microsoft.com/office/drawing/2010/main" w="9525">
                   <a:solidFill>
                     <a:srgbClr val="000000"/>
                   </a:solidFill>
@@ -3925,7 +3925,7 @@
             </a:ln>
             <a:extLst>
               <a:ext uri="{91240B29-F687-4f45-9708-019B960494DF}">
-                <a14:hiddenLine xmlns:a14="http://schemas.microsoft.com/office/drawing/2010/main" xmlns="" w="9525">
+                <a14:hiddenLine xmlns="" xmlns:a14="http://schemas.microsoft.com/office/drawing/2010/main" w="9525">
                   <a:solidFill>
                     <a:srgbClr val="000000"/>
                   </a:solidFill>
@@ -3987,7 +3987,7 @@
             </a:ln>
             <a:extLst>
               <a:ext uri="{91240B29-F687-4f45-9708-019B960494DF}">
-                <a14:hiddenLine xmlns:a14="http://schemas.microsoft.com/office/drawing/2010/main" xmlns="" w="9525">
+                <a14:hiddenLine xmlns="" xmlns:a14="http://schemas.microsoft.com/office/drawing/2010/main" w="9525">
                   <a:solidFill>
                     <a:srgbClr val="000000"/>
                   </a:solidFill>
@@ -4107,7 +4107,7 @@
             </a:ln>
             <a:extLst>
               <a:ext uri="{91240B29-F687-4f45-9708-019B960494DF}">
-                <a14:hiddenLine xmlns:a14="http://schemas.microsoft.com/office/drawing/2010/main" xmlns="" w="9525">
+                <a14:hiddenLine xmlns="" xmlns:a14="http://schemas.microsoft.com/office/drawing/2010/main" w="9525">
                   <a:solidFill>
                     <a:srgbClr val="000000"/>
                   </a:solidFill>
@@ -4175,7 +4175,7 @@
             </a:ln>
             <a:extLst>
               <a:ext uri="{91240B29-F687-4f45-9708-019B960494DF}">
-                <a14:hiddenLine xmlns:a14="http://schemas.microsoft.com/office/drawing/2010/main" xmlns="" w="9525">
+                <a14:hiddenLine xmlns="" xmlns:a14="http://schemas.microsoft.com/office/drawing/2010/main" w="9525">
                   <a:solidFill>
                     <a:srgbClr val="000000"/>
                   </a:solidFill>
@@ -4265,7 +4265,7 @@
             </a:ln>
             <a:extLst>
               <a:ext uri="{91240B29-F687-4f45-9708-019B960494DF}">
-                <a14:hiddenLine xmlns:a14="http://schemas.microsoft.com/office/drawing/2010/main" xmlns="" w="9525">
+                <a14:hiddenLine xmlns="" xmlns:a14="http://schemas.microsoft.com/office/drawing/2010/main" w="9525">
                   <a:solidFill>
                     <a:srgbClr val="000000"/>
                   </a:solidFill>
@@ -9079,7 +9079,7 @@
           <a:noFill/>
           <a:extLst>
             <a:ext uri="{909E8E84-426E-40dd-AFC4-6F175D3DCCD1}">
-              <a14:hiddenFill xmlns:a14="http://schemas.microsoft.com/office/drawing/2010/main" xmlns="">
+              <a14:hiddenFill xmlns="" xmlns:a14="http://schemas.microsoft.com/office/drawing/2010/main">
                 <a:solidFill>
                   <a:srgbClr val="FFFFFF"/>
                 </a:solidFill>
@@ -9153,7 +9153,7 @@
               </a:ln>
               <a:extLst>
                 <a:ext uri="{91240B29-F687-4f45-9708-019B960494DF}">
-                  <a14:hiddenLine xmlns:a14="http://schemas.microsoft.com/office/drawing/2010/main" xmlns="" w="9525">
+                  <a14:hiddenLine xmlns="" xmlns:a14="http://schemas.microsoft.com/office/drawing/2010/main" w="9525">
                     <a:solidFill>
                       <a:srgbClr val="000000"/>
                     </a:solidFill>
@@ -9243,7 +9243,7 @@
               </a:ln>
               <a:extLst>
                 <a:ext uri="{91240B29-F687-4f45-9708-019B960494DF}">
-                  <a14:hiddenLine xmlns:a14="http://schemas.microsoft.com/office/drawing/2010/main" xmlns="" w="9525">
+                  <a14:hiddenLine xmlns="" xmlns:a14="http://schemas.microsoft.com/office/drawing/2010/main" w="9525">
                     <a:solidFill>
                       <a:srgbClr val="000000"/>
                     </a:solidFill>
@@ -9333,7 +9333,7 @@
               </a:ln>
               <a:extLst>
                 <a:ext uri="{91240B29-F687-4f45-9708-019B960494DF}">
-                  <a14:hiddenLine xmlns:a14="http://schemas.microsoft.com/office/drawing/2010/main" xmlns="" w="9525">
+                  <a14:hiddenLine xmlns="" xmlns:a14="http://schemas.microsoft.com/office/drawing/2010/main" w="9525">
                     <a:solidFill>
                       <a:srgbClr val="000000"/>
                     </a:solidFill>
@@ -9395,7 +9395,7 @@
               </a:ln>
               <a:extLst>
                 <a:ext uri="{91240B29-F687-4f45-9708-019B960494DF}">
-                  <a14:hiddenLine xmlns:a14="http://schemas.microsoft.com/office/drawing/2010/main" xmlns="" w="9525">
+                  <a14:hiddenLine xmlns="" xmlns:a14="http://schemas.microsoft.com/office/drawing/2010/main" w="9525">
                     <a:solidFill>
                       <a:srgbClr val="000000"/>
                     </a:solidFill>
@@ -9485,7 +9485,7 @@
               </a:ln>
               <a:extLst>
                 <a:ext uri="{91240B29-F687-4f45-9708-019B960494DF}">
-                  <a14:hiddenLine xmlns:a14="http://schemas.microsoft.com/office/drawing/2010/main" xmlns="" w="9525">
+                  <a14:hiddenLine xmlns="" xmlns:a14="http://schemas.microsoft.com/office/drawing/2010/main" w="9525">
                     <a:solidFill>
                       <a:srgbClr val="000000"/>
                     </a:solidFill>
@@ -9547,7 +9547,7 @@
               </a:ln>
               <a:extLst>
                 <a:ext uri="{91240B29-F687-4f45-9708-019B960494DF}">
-                  <a14:hiddenLine xmlns:a14="http://schemas.microsoft.com/office/drawing/2010/main" xmlns="" w="9525">
+                  <a14:hiddenLine xmlns="" xmlns:a14="http://schemas.microsoft.com/office/drawing/2010/main" w="9525">
                     <a:solidFill>
                       <a:srgbClr val="000000"/>
                     </a:solidFill>
@@ -9609,7 +9609,7 @@
               </a:ln>
               <a:extLst>
                 <a:ext uri="{91240B29-F687-4f45-9708-019B960494DF}">
-                  <a14:hiddenLine xmlns:a14="http://schemas.microsoft.com/office/drawing/2010/main" xmlns="" w="9525">
+                  <a14:hiddenLine xmlns="" xmlns:a14="http://schemas.microsoft.com/office/drawing/2010/main" w="9525">
                     <a:solidFill>
                       <a:srgbClr val="000000"/>
                     </a:solidFill>
@@ -9699,7 +9699,7 @@
               </a:ln>
               <a:extLst>
                 <a:ext uri="{91240B29-F687-4f45-9708-019B960494DF}">
-                  <a14:hiddenLine xmlns:a14="http://schemas.microsoft.com/office/drawing/2010/main" xmlns="" w="9525">
+                  <a14:hiddenLine xmlns="" xmlns:a14="http://schemas.microsoft.com/office/drawing/2010/main" w="9525">
                     <a:solidFill>
                       <a:srgbClr val="000000"/>
                     </a:solidFill>
@@ -9789,7 +9789,7 @@
               </a:ln>
               <a:extLst>
                 <a:ext uri="{91240B29-F687-4f45-9708-019B960494DF}">
-                  <a14:hiddenLine xmlns:a14="http://schemas.microsoft.com/office/drawing/2010/main" xmlns="" w="9525">
+                  <a14:hiddenLine xmlns="" xmlns:a14="http://schemas.microsoft.com/office/drawing/2010/main" w="9525">
                     <a:solidFill>
                       <a:srgbClr val="000000"/>
                     </a:solidFill>
@@ -9851,7 +9851,7 @@
               </a:ln>
               <a:extLst>
                 <a:ext uri="{91240B29-F687-4f45-9708-019B960494DF}">
-                  <a14:hiddenLine xmlns:a14="http://schemas.microsoft.com/office/drawing/2010/main" xmlns="" w="9525">
+                  <a14:hiddenLine xmlns="" xmlns:a14="http://schemas.microsoft.com/office/drawing/2010/main" w="9525">
                     <a:solidFill>
                       <a:srgbClr val="000000"/>
                     </a:solidFill>
@@ -9961,7 +9961,7 @@
               </a:ln>
               <a:extLst>
                 <a:ext uri="{91240B29-F687-4f45-9708-019B960494DF}">
-                  <a14:hiddenLine xmlns:a14="http://schemas.microsoft.com/office/drawing/2010/main" xmlns="" w="9525">
+                  <a14:hiddenLine xmlns="" xmlns:a14="http://schemas.microsoft.com/office/drawing/2010/main" w="9525">
                     <a:solidFill>
                       <a:srgbClr val="000000"/>
                     </a:solidFill>
@@ -10045,7 +10045,7 @@
               </a:ln>
               <a:extLst>
                 <a:ext uri="{91240B29-F687-4f45-9708-019B960494DF}">
-                  <a14:hiddenLine xmlns:a14="http://schemas.microsoft.com/office/drawing/2010/main" xmlns="" w="9525">
+                  <a14:hiddenLine xmlns="" xmlns:a14="http://schemas.microsoft.com/office/drawing/2010/main" w="9525">
                     <a:solidFill>
                       <a:srgbClr val="000000"/>
                     </a:solidFill>
@@ -10107,7 +10107,7 @@
               </a:ln>
               <a:extLst>
                 <a:ext uri="{91240B29-F687-4f45-9708-019B960494DF}">
-                  <a14:hiddenLine xmlns:a14="http://schemas.microsoft.com/office/drawing/2010/main" xmlns="" w="9525">
+                  <a14:hiddenLine xmlns="" xmlns:a14="http://schemas.microsoft.com/office/drawing/2010/main" w="9525">
                     <a:solidFill>
                       <a:srgbClr val="000000"/>
                     </a:solidFill>
@@ -10169,7 +10169,7 @@
               </a:ln>
               <a:extLst>
                 <a:ext uri="{91240B29-F687-4f45-9708-019B960494DF}">
-                  <a14:hiddenLine xmlns:a14="http://schemas.microsoft.com/office/drawing/2010/main" xmlns="" w="9525">
+                  <a14:hiddenLine xmlns="" xmlns:a14="http://schemas.microsoft.com/office/drawing/2010/main" w="9525">
                     <a:solidFill>
                       <a:srgbClr val="000000"/>
                     </a:solidFill>
@@ -10259,7 +10259,7 @@
               </a:ln>
               <a:extLst>
                 <a:ext uri="{91240B29-F687-4f45-9708-019B960494DF}">
-                  <a14:hiddenLine xmlns:a14="http://schemas.microsoft.com/office/drawing/2010/main" xmlns="" w="9525">
+                  <a14:hiddenLine xmlns="" xmlns:a14="http://schemas.microsoft.com/office/drawing/2010/main" w="9525">
                     <a:solidFill>
                       <a:srgbClr val="000000"/>
                     </a:solidFill>
@@ -10293,7 +10293,7 @@
               </a:ln>
               <a:extLst>
                 <a:ext uri="{91240B29-F687-4f45-9708-019B960494DF}">
-                  <a14:hiddenLine xmlns:a14="http://schemas.microsoft.com/office/drawing/2010/main" xmlns="" w="9525">
+                  <a14:hiddenLine xmlns="" xmlns:a14="http://schemas.microsoft.com/office/drawing/2010/main" w="9525">
                     <a:solidFill>
                       <a:srgbClr val="000000"/>
                     </a:solidFill>
@@ -10358,7 +10358,7 @@
               </a:ln>
               <a:extLst>
                 <a:ext uri="{91240B29-F687-4f45-9708-019B960494DF}">
-                  <a14:hiddenLine xmlns:a14="http://schemas.microsoft.com/office/drawing/2010/main" xmlns="" w="9525">
+                  <a14:hiddenLine xmlns="" xmlns:a14="http://schemas.microsoft.com/office/drawing/2010/main" w="9525">
                     <a:solidFill>
                       <a:srgbClr val="000000"/>
                     </a:solidFill>
@@ -10448,7 +10448,7 @@
               </a:ln>
               <a:extLst>
                 <a:ext uri="{91240B29-F687-4f45-9708-019B960494DF}">
-                  <a14:hiddenLine xmlns:a14="http://schemas.microsoft.com/office/drawing/2010/main" xmlns="" w="9525">
+                  <a14:hiddenLine xmlns="" xmlns:a14="http://schemas.microsoft.com/office/drawing/2010/main" w="9525">
                     <a:solidFill>
                       <a:srgbClr val="000000"/>
                     </a:solidFill>
@@ -10510,7 +10510,7 @@
               </a:ln>
               <a:extLst>
                 <a:ext uri="{91240B29-F687-4f45-9708-019B960494DF}">
-                  <a14:hiddenLine xmlns:a14="http://schemas.microsoft.com/office/drawing/2010/main" xmlns="" w="9525">
+                  <a14:hiddenLine xmlns="" xmlns:a14="http://schemas.microsoft.com/office/drawing/2010/main" w="9525">
                     <a:solidFill>
                       <a:srgbClr val="000000"/>
                     </a:solidFill>
@@ -10600,7 +10600,7 @@
               </a:ln>
               <a:extLst>
                 <a:ext uri="{91240B29-F687-4f45-9708-019B960494DF}">
-                  <a14:hiddenLine xmlns:a14="http://schemas.microsoft.com/office/drawing/2010/main" xmlns="" w="9525">
+                  <a14:hiddenLine xmlns="" xmlns:a14="http://schemas.microsoft.com/office/drawing/2010/main" w="9525">
                     <a:solidFill>
                       <a:srgbClr val="000000"/>
                     </a:solidFill>
@@ -10665,7 +10665,7 @@
               </a:ln>
               <a:extLst>
                 <a:ext uri="{91240B29-F687-4f45-9708-019B960494DF}">
-                  <a14:hiddenLine xmlns:a14="http://schemas.microsoft.com/office/drawing/2010/main" xmlns="" w="9525">
+                  <a14:hiddenLine xmlns="" xmlns:a14="http://schemas.microsoft.com/office/drawing/2010/main" w="9525">
                     <a:solidFill>
                       <a:srgbClr val="000000"/>
                     </a:solidFill>
@@ -10727,7 +10727,7 @@
               </a:ln>
               <a:extLst>
                 <a:ext uri="{91240B29-F687-4f45-9708-019B960494DF}">
-                  <a14:hiddenLine xmlns:a14="http://schemas.microsoft.com/office/drawing/2010/main" xmlns="" w="9525">
+                  <a14:hiddenLine xmlns="" xmlns:a14="http://schemas.microsoft.com/office/drawing/2010/main" w="9525">
                     <a:solidFill>
                       <a:srgbClr val="000000"/>
                     </a:solidFill>
@@ -10817,7 +10817,7 @@
               </a:ln>
               <a:extLst>
                 <a:ext uri="{91240B29-F687-4f45-9708-019B960494DF}">
-                  <a14:hiddenLine xmlns:a14="http://schemas.microsoft.com/office/drawing/2010/main" xmlns="" w="9525">
+                  <a14:hiddenLine xmlns="" xmlns:a14="http://schemas.microsoft.com/office/drawing/2010/main" w="9525">
                     <a:solidFill>
                       <a:srgbClr val="000000"/>
                     </a:solidFill>
@@ -10907,7 +10907,7 @@
               </a:ln>
               <a:extLst>
                 <a:ext uri="{91240B29-F687-4f45-9708-019B960494DF}">
-                  <a14:hiddenLine xmlns:a14="http://schemas.microsoft.com/office/drawing/2010/main" xmlns="" w="9525">
+                  <a14:hiddenLine xmlns="" xmlns:a14="http://schemas.microsoft.com/office/drawing/2010/main" w="9525">
                     <a:solidFill>
                       <a:srgbClr val="000000"/>
                     </a:solidFill>
@@ -10972,7 +10972,7 @@
               </a:ln>
               <a:extLst>
                 <a:ext uri="{91240B29-F687-4f45-9708-019B960494DF}">
-                  <a14:hiddenLine xmlns:a14="http://schemas.microsoft.com/office/drawing/2010/main" xmlns="" w="9525">
+                  <a14:hiddenLine xmlns="" xmlns:a14="http://schemas.microsoft.com/office/drawing/2010/main" w="9525">
                     <a:solidFill>
                       <a:srgbClr val="000000"/>
                     </a:solidFill>
@@ -11092,7 +11092,7 @@
               </a:ln>
               <a:extLst>
                 <a:ext uri="{91240B29-F687-4f45-9708-019B960494DF}">
-                  <a14:hiddenLine xmlns:a14="http://schemas.microsoft.com/office/drawing/2010/main" xmlns="" w="9525">
+                  <a14:hiddenLine xmlns="" xmlns:a14="http://schemas.microsoft.com/office/drawing/2010/main" w="9525">
                     <a:solidFill>
                       <a:srgbClr val="000000"/>
                     </a:solidFill>
@@ -11173,7 +11173,7 @@
               </a:ln>
               <a:extLst>
                 <a:ext uri="{91240B29-F687-4f45-9708-019B960494DF}">
-                  <a14:hiddenLine xmlns:a14="http://schemas.microsoft.com/office/drawing/2010/main" xmlns="" w="9525">
+                  <a14:hiddenLine xmlns="" xmlns:a14="http://schemas.microsoft.com/office/drawing/2010/main" w="9525">
                     <a:solidFill>
                       <a:srgbClr val="000000"/>
                     </a:solidFill>
@@ -11288,7 +11288,7 @@
               </a:ln>
               <a:extLst>
                 <a:ext uri="{91240B29-F687-4f45-9708-019B960494DF}">
-                  <a14:hiddenLine xmlns:a14="http://schemas.microsoft.com/office/drawing/2010/main" xmlns="" w="9525">
+                  <a14:hiddenLine xmlns="" xmlns:a14="http://schemas.microsoft.com/office/drawing/2010/main" w="9525">
                     <a:solidFill>
                       <a:srgbClr val="000000"/>
                     </a:solidFill>
@@ -11378,7 +11378,7 @@
               </a:ln>
               <a:extLst>
                 <a:ext uri="{91240B29-F687-4f45-9708-019B960494DF}">
-                  <a14:hiddenLine xmlns:a14="http://schemas.microsoft.com/office/drawing/2010/main" xmlns="" w="9525">
+                  <a14:hiddenLine xmlns="" xmlns:a14="http://schemas.microsoft.com/office/drawing/2010/main" w="9525">
                     <a:solidFill>
                       <a:srgbClr val="000000"/>
                     </a:solidFill>
@@ -11443,7 +11443,7 @@
               </a:ln>
               <a:extLst>
                 <a:ext uri="{91240B29-F687-4f45-9708-019B960494DF}">
-                  <a14:hiddenLine xmlns:a14="http://schemas.microsoft.com/office/drawing/2010/main" xmlns="" w="9525">
+                  <a14:hiddenLine xmlns="" xmlns:a14="http://schemas.microsoft.com/office/drawing/2010/main" w="9525">
                     <a:solidFill>
                       <a:srgbClr val="000000"/>
                     </a:solidFill>
@@ -11533,7 +11533,7 @@
               </a:ln>
               <a:extLst>
                 <a:ext uri="{91240B29-F687-4f45-9708-019B960494DF}">
-                  <a14:hiddenLine xmlns:a14="http://schemas.microsoft.com/office/drawing/2010/main" xmlns="" w="9525">
+                  <a14:hiddenLine xmlns="" xmlns:a14="http://schemas.microsoft.com/office/drawing/2010/main" w="9525">
                     <a:solidFill>
                       <a:srgbClr val="000000"/>
                     </a:solidFill>
@@ -11601,7 +11601,7 @@
               </a:ln>
               <a:extLst>
                 <a:ext uri="{91240B29-F687-4f45-9708-019B960494DF}">
-                  <a14:hiddenLine xmlns:a14="http://schemas.microsoft.com/office/drawing/2010/main" xmlns="" w="9525">
+                  <a14:hiddenLine xmlns="" xmlns:a14="http://schemas.microsoft.com/office/drawing/2010/main" w="9525">
                     <a:solidFill>
                       <a:srgbClr val="000000"/>
                     </a:solidFill>
@@ -11691,7 +11691,7 @@
               </a:ln>
               <a:extLst>
                 <a:ext uri="{91240B29-F687-4f45-9708-019B960494DF}">
-                  <a14:hiddenLine xmlns:a14="http://schemas.microsoft.com/office/drawing/2010/main" xmlns="" w="9525">
+                  <a14:hiddenLine xmlns="" xmlns:a14="http://schemas.microsoft.com/office/drawing/2010/main" w="9525">
                     <a:solidFill>
                       <a:srgbClr val="000000"/>
                     </a:solidFill>
@@ -11759,7 +11759,7 @@
               </a:ln>
               <a:extLst>
                 <a:ext uri="{91240B29-F687-4f45-9708-019B960494DF}">
-                  <a14:hiddenLine xmlns:a14="http://schemas.microsoft.com/office/drawing/2010/main" xmlns="" w="9525">
+                  <a14:hiddenLine xmlns="" xmlns:a14="http://schemas.microsoft.com/office/drawing/2010/main" w="9525">
                     <a:solidFill>
                       <a:srgbClr val="000000"/>
                     </a:solidFill>
@@ -11849,7 +11849,7 @@
               </a:ln>
               <a:extLst>
                 <a:ext uri="{91240B29-F687-4f45-9708-019B960494DF}">
-                  <a14:hiddenLine xmlns:a14="http://schemas.microsoft.com/office/drawing/2010/main" xmlns="" w="9525">
+                  <a14:hiddenLine xmlns="" xmlns:a14="http://schemas.microsoft.com/office/drawing/2010/main" w="9525">
                     <a:solidFill>
                       <a:srgbClr val="000000"/>
                     </a:solidFill>
@@ -11883,7 +11883,7 @@
               </a:ln>
               <a:extLst>
                 <a:ext uri="{91240B29-F687-4f45-9708-019B960494DF}">
-                  <a14:hiddenLine xmlns:a14="http://schemas.microsoft.com/office/drawing/2010/main" xmlns="" w="9525">
+                  <a14:hiddenLine xmlns="" xmlns:a14="http://schemas.microsoft.com/office/drawing/2010/main" w="9525">
                     <a:solidFill>
                       <a:srgbClr val="000000"/>
                     </a:solidFill>
@@ -12738,6 +12738,89 @@
           </a:p>
         </p:txBody>
       </p:sp>
+      <p:sp>
+        <p:nvSpPr>
+          <p:cNvPr id="3" name="CuadroTexto 2">
+            <a:extLst>
+              <a:ext uri="{FF2B5EF4-FFF2-40B4-BE49-F238E27FC236}">
+                <a16:creationId xmlns:a16="http://schemas.microsoft.com/office/drawing/2014/main" id="{DB451F27-448E-A169-5BB5-A0C77AAFA8AD}"/>
+              </a:ext>
+            </a:extLst>
+          </p:cNvPr>
+          <p:cNvSpPr txBox="1"/>
+          <p:nvPr/>
+        </p:nvSpPr>
+        <p:spPr>
+          <a:xfrm>
+            <a:off x="692009" y="2843647"/>
+            <a:ext cx="4260184" cy="369332"/>
+          </a:xfrm>
+          <a:prstGeom prst="rect">
+            <a:avLst/>
+          </a:prstGeom>
+          <a:noFill/>
+        </p:spPr>
+        <p:txBody>
+          <a:bodyPr wrap="square" rtlCol="0">
+            <a:spAutoFit/>
+          </a:bodyPr>
+          <a:lstStyle/>
+          <a:p>
+            <a:r>
+              <a:rPr lang="es-PE" dirty="0"/>
+              <a:t>Librería pandas versión 2.1.4</a:t>
+            </a:r>
+            <a:endParaRPr lang="es-ES" dirty="0"/>
+          </a:p>
+        </p:txBody>
+      </p:sp>
+      <p:pic>
+        <p:nvPicPr>
+          <p:cNvPr id="1026" name="Picture 2" descr="pandas (software) - Wikipedia">
+            <a:extLst>
+              <a:ext uri="{FF2B5EF4-FFF2-40B4-BE49-F238E27FC236}">
+                <a16:creationId xmlns:a16="http://schemas.microsoft.com/office/drawing/2014/main" id="{5735E0C7-7654-7A0A-81EC-406CC0ABA480}"/>
+              </a:ext>
+            </a:extLst>
+          </p:cNvPr>
+          <p:cNvPicPr>
+            <a:picLocks noChangeAspect="1" noChangeArrowheads="1"/>
+          </p:cNvPicPr>
+          <p:nvPr/>
+        </p:nvPicPr>
+        <p:blipFill>
+          <a:blip r:embed="rId2">
+            <a:extLst>
+              <a:ext uri="{28A0092B-C50C-407E-A947-70E740481C1C}">
+                <a14:useLocalDpi xmlns:a14="http://schemas.microsoft.com/office/drawing/2010/main" val="0"/>
+              </a:ext>
+            </a:extLst>
+          </a:blip>
+          <a:srcRect/>
+          <a:stretch>
+            <a:fillRect/>
+          </a:stretch>
+        </p:blipFill>
+        <p:spPr bwMode="auto">
+          <a:xfrm>
+            <a:off x="662581" y="1203883"/>
+            <a:ext cx="3673376" cy="1484656"/>
+          </a:xfrm>
+          <a:prstGeom prst="rect">
+            <a:avLst/>
+          </a:prstGeom>
+          <a:noFill/>
+          <a:extLst>
+            <a:ext uri="{909E8E84-426E-40DD-AFC4-6F175D3DCCD1}">
+              <a14:hiddenFill xmlns:a14="http://schemas.microsoft.com/office/drawing/2010/main">
+                <a:solidFill>
+                  <a:srgbClr val="FFFFFF"/>
+                </a:solidFill>
+              </a14:hiddenFill>
+            </a:ext>
+          </a:extLst>
+        </p:spPr>
+      </p:pic>
     </p:spTree>
     <p:extLst>
       <p:ext uri="{BB962C8B-B14F-4D97-AF65-F5344CB8AC3E}">
@@ -13640,6 +13723,41 @@
           </p:spPr>
         </p:pic>
       </p:grpSp>
+      <p:sp>
+        <p:nvSpPr>
+          <p:cNvPr id="3" name="CuadroTexto 2">
+            <a:extLst>
+              <a:ext uri="{FF2B5EF4-FFF2-40B4-BE49-F238E27FC236}">
+                <a16:creationId xmlns:a16="http://schemas.microsoft.com/office/drawing/2014/main" id="{4831FFCD-F188-F942-BF9A-8B4E9F373CE9}"/>
+              </a:ext>
+            </a:extLst>
+          </p:cNvPr>
+          <p:cNvSpPr txBox="1"/>
+          <p:nvPr/>
+        </p:nvSpPr>
+        <p:spPr>
+          <a:xfrm>
+            <a:off x="1081479" y="3948851"/>
+            <a:ext cx="4788616" cy="646331"/>
+          </a:xfrm>
+          <a:prstGeom prst="rect">
+            <a:avLst/>
+          </a:prstGeom>
+          <a:noFill/>
+        </p:spPr>
+        <p:txBody>
+          <a:bodyPr wrap="square" rtlCol="0">
+            <a:spAutoFit/>
+          </a:bodyPr>
+          <a:lstStyle/>
+          <a:p>
+            <a:r>
+              <a:rPr lang="es-ES" dirty="0"/>
+              <a:t>https://www.kaggle.com/datasets/mrsimple07/laptoppriceprediction</a:t>
+            </a:r>
+          </a:p>
+        </p:txBody>
+      </p:sp>
     </p:spTree>
     <p:extLst>
       <p:ext uri="{BB962C8B-B14F-4D97-AF65-F5344CB8AC3E}">

</xml_diff>

<commit_message>
Agregue una pequeña parte del seaborn para el proyecto
</commit_message>
<xml_diff>
--- a/PROYECTO-MACHINE-LEARNING.pptx
+++ b/PROYECTO-MACHINE-LEARNING.pptx
@@ -180,7 +180,7 @@
           <a:noFill/>
           <a:extLst>
             <a:ext uri="{909E8E84-426E-40dd-AFC4-6F175D3DCCD1}">
-              <a14:hiddenFill xmlns:a14="http://schemas.microsoft.com/office/drawing/2010/main" xmlns="">
+              <a14:hiddenFill xmlns="" xmlns:a14="http://schemas.microsoft.com/office/drawing/2010/main">
                 <a:solidFill>
                   <a:srgbClr val="FFFFFF"/>
                 </a:solidFill>
@@ -239,7 +239,7 @@
             </a:ln>
             <a:extLst>
               <a:ext uri="{91240B29-F687-4f45-9708-019B960494DF}">
-                <a14:hiddenLine xmlns:a14="http://schemas.microsoft.com/office/drawing/2010/main" xmlns="" w="9525">
+                <a14:hiddenLine xmlns="" xmlns:a14="http://schemas.microsoft.com/office/drawing/2010/main" w="9525">
                   <a:solidFill>
                     <a:srgbClr val="000000"/>
                   </a:solidFill>
@@ -329,7 +329,7 @@
             </a:ln>
             <a:extLst>
               <a:ext uri="{91240B29-F687-4f45-9708-019B960494DF}">
-                <a14:hiddenLine xmlns:a14="http://schemas.microsoft.com/office/drawing/2010/main" xmlns="" w="9525">
+                <a14:hiddenLine xmlns="" xmlns:a14="http://schemas.microsoft.com/office/drawing/2010/main" w="9525">
                   <a:solidFill>
                     <a:srgbClr val="000000"/>
                   </a:solidFill>
@@ -419,7 +419,7 @@
             </a:ln>
             <a:extLst>
               <a:ext uri="{91240B29-F687-4f45-9708-019B960494DF}">
-                <a14:hiddenLine xmlns:a14="http://schemas.microsoft.com/office/drawing/2010/main" xmlns="" w="9525">
+                <a14:hiddenLine xmlns="" xmlns:a14="http://schemas.microsoft.com/office/drawing/2010/main" w="9525">
                   <a:solidFill>
                     <a:srgbClr val="000000"/>
                   </a:solidFill>
@@ -453,7 +453,7 @@
             </a:ln>
             <a:extLst>
               <a:ext uri="{91240B29-F687-4f45-9708-019B960494DF}">
-                <a14:hiddenLine xmlns:a14="http://schemas.microsoft.com/office/drawing/2010/main" xmlns="" w="9525">
+                <a14:hiddenLine xmlns="" xmlns:a14="http://schemas.microsoft.com/office/drawing/2010/main" w="9525">
                   <a:solidFill>
                     <a:srgbClr val="000000"/>
                   </a:solidFill>
@@ -543,7 +543,7 @@
             </a:ln>
             <a:extLst>
               <a:ext uri="{91240B29-F687-4f45-9708-019B960494DF}">
-                <a14:hiddenLine xmlns:a14="http://schemas.microsoft.com/office/drawing/2010/main" xmlns="" w="9525">
+                <a14:hiddenLine xmlns="" xmlns:a14="http://schemas.microsoft.com/office/drawing/2010/main" w="9525">
                   <a:solidFill>
                     <a:srgbClr val="000000"/>
                   </a:solidFill>
@@ -605,7 +605,7 @@
             </a:ln>
             <a:extLst>
               <a:ext uri="{91240B29-F687-4f45-9708-019B960494DF}">
-                <a14:hiddenLine xmlns:a14="http://schemas.microsoft.com/office/drawing/2010/main" xmlns="" w="9525">
+                <a14:hiddenLine xmlns="" xmlns:a14="http://schemas.microsoft.com/office/drawing/2010/main" w="9525">
                   <a:solidFill>
                     <a:srgbClr val="000000"/>
                   </a:solidFill>
@@ -667,7 +667,7 @@
             </a:ln>
             <a:extLst>
               <a:ext uri="{91240B29-F687-4f45-9708-019B960494DF}">
-                <a14:hiddenLine xmlns:a14="http://schemas.microsoft.com/office/drawing/2010/main" xmlns="" w="9525">
+                <a14:hiddenLine xmlns="" xmlns:a14="http://schemas.microsoft.com/office/drawing/2010/main" w="9525">
                   <a:solidFill>
                     <a:srgbClr val="000000"/>
                   </a:solidFill>
@@ -757,7 +757,7 @@
             </a:ln>
             <a:extLst>
               <a:ext uri="{91240B29-F687-4f45-9708-019B960494DF}">
-                <a14:hiddenLine xmlns:a14="http://schemas.microsoft.com/office/drawing/2010/main" xmlns="" w="9525">
+                <a14:hiddenLine xmlns="" xmlns:a14="http://schemas.microsoft.com/office/drawing/2010/main" w="9525">
                   <a:solidFill>
                     <a:srgbClr val="000000"/>
                   </a:solidFill>
@@ -819,7 +819,7 @@
             </a:ln>
             <a:extLst>
               <a:ext uri="{91240B29-F687-4f45-9708-019B960494DF}">
-                <a14:hiddenLine xmlns:a14="http://schemas.microsoft.com/office/drawing/2010/main" xmlns="" w="9525">
+                <a14:hiddenLine xmlns="" xmlns:a14="http://schemas.microsoft.com/office/drawing/2010/main" w="9525">
                   <a:solidFill>
                     <a:srgbClr val="000000"/>
                   </a:solidFill>
@@ -881,7 +881,7 @@
             </a:ln>
             <a:extLst>
               <a:ext uri="{91240B29-F687-4f45-9708-019B960494DF}">
-                <a14:hiddenLine xmlns:a14="http://schemas.microsoft.com/office/drawing/2010/main" xmlns="" w="9525">
+                <a14:hiddenLine xmlns="" xmlns:a14="http://schemas.microsoft.com/office/drawing/2010/main" w="9525">
                   <a:solidFill>
                     <a:srgbClr val="000000"/>
                   </a:solidFill>
@@ -971,7 +971,7 @@
             </a:ln>
             <a:extLst>
               <a:ext uri="{91240B29-F687-4f45-9708-019B960494DF}">
-                <a14:hiddenLine xmlns:a14="http://schemas.microsoft.com/office/drawing/2010/main" xmlns="" w="9525">
+                <a14:hiddenLine xmlns="" xmlns:a14="http://schemas.microsoft.com/office/drawing/2010/main" w="9525">
                   <a:solidFill>
                     <a:srgbClr val="000000"/>
                   </a:solidFill>
@@ -1061,7 +1061,7 @@
             </a:ln>
             <a:extLst>
               <a:ext uri="{91240B29-F687-4f45-9708-019B960494DF}">
-                <a14:hiddenLine xmlns:a14="http://schemas.microsoft.com/office/drawing/2010/main" xmlns="" w="9525">
+                <a14:hiddenLine xmlns="" xmlns:a14="http://schemas.microsoft.com/office/drawing/2010/main" w="9525">
                   <a:solidFill>
                     <a:srgbClr val="000000"/>
                   </a:solidFill>
@@ -1123,7 +1123,7 @@
             </a:ln>
             <a:extLst>
               <a:ext uri="{91240B29-F687-4f45-9708-019B960494DF}">
-                <a14:hiddenLine xmlns:a14="http://schemas.microsoft.com/office/drawing/2010/main" xmlns="" w="9525">
+                <a14:hiddenLine xmlns="" xmlns:a14="http://schemas.microsoft.com/office/drawing/2010/main" w="9525">
                   <a:solidFill>
                     <a:srgbClr val="000000"/>
                   </a:solidFill>
@@ -1233,7 +1233,7 @@
             </a:ln>
             <a:extLst>
               <a:ext uri="{91240B29-F687-4f45-9708-019B960494DF}">
-                <a14:hiddenLine xmlns:a14="http://schemas.microsoft.com/office/drawing/2010/main" xmlns="" w="9525">
+                <a14:hiddenLine xmlns="" xmlns:a14="http://schemas.microsoft.com/office/drawing/2010/main" w="9525">
                   <a:solidFill>
                     <a:srgbClr val="000000"/>
                   </a:solidFill>
@@ -1295,7 +1295,7 @@
             </a:ln>
             <a:extLst>
               <a:ext uri="{91240B29-F687-4f45-9708-019B960494DF}">
-                <a14:hiddenLine xmlns:a14="http://schemas.microsoft.com/office/drawing/2010/main" xmlns="" w="9525">
+                <a14:hiddenLine xmlns="" xmlns:a14="http://schemas.microsoft.com/office/drawing/2010/main" w="9525">
                   <a:solidFill>
                     <a:srgbClr val="000000"/>
                   </a:solidFill>
@@ -1385,7 +1385,7 @@
             </a:ln>
             <a:extLst>
               <a:ext uri="{91240B29-F687-4f45-9708-019B960494DF}">
-                <a14:hiddenLine xmlns:a14="http://schemas.microsoft.com/office/drawing/2010/main" xmlns="" w="9525">
+                <a14:hiddenLine xmlns="" xmlns:a14="http://schemas.microsoft.com/office/drawing/2010/main" w="9525">
                   <a:solidFill>
                     <a:srgbClr val="000000"/>
                   </a:solidFill>
@@ -1475,7 +1475,7 @@
             </a:ln>
             <a:extLst>
               <a:ext uri="{91240B29-F687-4f45-9708-019B960494DF}">
-                <a14:hiddenLine xmlns:a14="http://schemas.microsoft.com/office/drawing/2010/main" xmlns="" w="9525">
+                <a14:hiddenLine xmlns="" xmlns:a14="http://schemas.microsoft.com/office/drawing/2010/main" w="9525">
                   <a:solidFill>
                     <a:srgbClr val="000000"/>
                   </a:solidFill>
@@ -1537,7 +1537,7 @@
             </a:ln>
             <a:extLst>
               <a:ext uri="{91240B29-F687-4f45-9708-019B960494DF}">
-                <a14:hiddenLine xmlns:a14="http://schemas.microsoft.com/office/drawing/2010/main" xmlns="" w="9525">
+                <a14:hiddenLine xmlns="" xmlns:a14="http://schemas.microsoft.com/office/drawing/2010/main" w="9525">
                   <a:solidFill>
                     <a:srgbClr val="000000"/>
                   </a:solidFill>
@@ -1627,7 +1627,7 @@
             </a:ln>
             <a:extLst>
               <a:ext uri="{91240B29-F687-4f45-9708-019B960494DF}">
-                <a14:hiddenLine xmlns:a14="http://schemas.microsoft.com/office/drawing/2010/main" xmlns="" w="9525">
+                <a14:hiddenLine xmlns="" xmlns:a14="http://schemas.microsoft.com/office/drawing/2010/main" w="9525">
                   <a:solidFill>
                     <a:srgbClr val="000000"/>
                   </a:solidFill>
@@ -1717,7 +1717,7 @@
             </a:ln>
             <a:extLst>
               <a:ext uri="{91240B29-F687-4f45-9708-019B960494DF}">
-                <a14:hiddenLine xmlns:a14="http://schemas.microsoft.com/office/drawing/2010/main" xmlns="" w="9525">
+                <a14:hiddenLine xmlns="" xmlns:a14="http://schemas.microsoft.com/office/drawing/2010/main" w="9525">
                   <a:solidFill>
                     <a:srgbClr val="000000"/>
                   </a:solidFill>
@@ -1773,7 +1773,7 @@
             </a:ln>
             <a:extLst>
               <a:ext uri="{91240B29-F687-4f45-9708-019B960494DF}">
-                <a14:hiddenLine xmlns:a14="http://schemas.microsoft.com/office/drawing/2010/main" xmlns="" w="9525">
+                <a14:hiddenLine xmlns="" xmlns:a14="http://schemas.microsoft.com/office/drawing/2010/main" w="9525">
                   <a:solidFill>
                     <a:srgbClr val="000000"/>
                   </a:solidFill>
@@ -1863,7 +1863,7 @@
             </a:ln>
             <a:extLst>
               <a:ext uri="{91240B29-F687-4f45-9708-019B960494DF}">
-                <a14:hiddenLine xmlns:a14="http://schemas.microsoft.com/office/drawing/2010/main" xmlns="" w="9525">
+                <a14:hiddenLine xmlns="" xmlns:a14="http://schemas.microsoft.com/office/drawing/2010/main" w="9525">
                   <a:solidFill>
                     <a:srgbClr val="000000"/>
                   </a:solidFill>
@@ -1919,7 +1919,7 @@
             </a:ln>
             <a:extLst>
               <a:ext uri="{91240B29-F687-4f45-9708-019B960494DF}">
-                <a14:hiddenLine xmlns:a14="http://schemas.microsoft.com/office/drawing/2010/main" xmlns="" w="9525">
+                <a14:hiddenLine xmlns="" xmlns:a14="http://schemas.microsoft.com/office/drawing/2010/main" w="9525">
                   <a:solidFill>
                     <a:srgbClr val="000000"/>
                   </a:solidFill>
@@ -2009,7 +2009,7 @@
             </a:ln>
             <a:extLst>
               <a:ext uri="{91240B29-F687-4f45-9708-019B960494DF}">
-                <a14:hiddenLine xmlns:a14="http://schemas.microsoft.com/office/drawing/2010/main" xmlns="" w="9525">
+                <a14:hiddenLine xmlns="" xmlns:a14="http://schemas.microsoft.com/office/drawing/2010/main" w="9525">
                   <a:solidFill>
                     <a:srgbClr val="000000"/>
                   </a:solidFill>
@@ -2077,7 +2077,7 @@
             </a:ln>
             <a:extLst>
               <a:ext uri="{91240B29-F687-4f45-9708-019B960494DF}">
-                <a14:hiddenLine xmlns:a14="http://schemas.microsoft.com/office/drawing/2010/main" xmlns="" w="9525">
+                <a14:hiddenLine xmlns="" xmlns:a14="http://schemas.microsoft.com/office/drawing/2010/main" w="9525">
                   <a:solidFill>
                     <a:srgbClr val="000000"/>
                   </a:solidFill>
@@ -2167,7 +2167,7 @@
             </a:ln>
             <a:extLst>
               <a:ext uri="{91240B29-F687-4f45-9708-019B960494DF}">
-                <a14:hiddenLine xmlns:a14="http://schemas.microsoft.com/office/drawing/2010/main" xmlns="" w="9525">
+                <a14:hiddenLine xmlns="" xmlns:a14="http://schemas.microsoft.com/office/drawing/2010/main" w="9525">
                   <a:solidFill>
                     <a:srgbClr val="000000"/>
                   </a:solidFill>
@@ -2235,7 +2235,7 @@
             </a:ln>
             <a:extLst>
               <a:ext uri="{91240B29-F687-4f45-9708-019B960494DF}">
-                <a14:hiddenLine xmlns:a14="http://schemas.microsoft.com/office/drawing/2010/main" xmlns="" w="9525">
+                <a14:hiddenLine xmlns="" xmlns:a14="http://schemas.microsoft.com/office/drawing/2010/main" w="9525">
                   <a:solidFill>
                     <a:srgbClr val="000000"/>
                   </a:solidFill>
@@ -2325,7 +2325,7 @@
             </a:ln>
             <a:extLst>
               <a:ext uri="{91240B29-F687-4f45-9708-019B960494DF}">
-                <a14:hiddenLine xmlns:a14="http://schemas.microsoft.com/office/drawing/2010/main" xmlns="" w="9525">
+                <a14:hiddenLine xmlns="" xmlns:a14="http://schemas.microsoft.com/office/drawing/2010/main" w="9525">
                   <a:solidFill>
                     <a:srgbClr val="000000"/>
                   </a:solidFill>
@@ -2359,7 +2359,7 @@
             </a:ln>
             <a:extLst>
               <a:ext uri="{91240B29-F687-4f45-9708-019B960494DF}">
-                <a14:hiddenLine xmlns:a14="http://schemas.microsoft.com/office/drawing/2010/main" xmlns="" w="9525">
+                <a14:hiddenLine xmlns="" xmlns:a14="http://schemas.microsoft.com/office/drawing/2010/main" w="9525">
                   <a:solidFill>
                     <a:srgbClr val="000000"/>
                   </a:solidFill>
@@ -2449,7 +2449,7 @@
             </a:ln>
             <a:extLst>
               <a:ext uri="{91240B29-F687-4f45-9708-019B960494DF}">
-                <a14:hiddenLine xmlns:a14="http://schemas.microsoft.com/office/drawing/2010/main" xmlns="" w="9525">
+                <a14:hiddenLine xmlns="" xmlns:a14="http://schemas.microsoft.com/office/drawing/2010/main" w="9525">
                   <a:solidFill>
                     <a:srgbClr val="000000"/>
                   </a:solidFill>
@@ -2511,7 +2511,7 @@
             </a:ln>
             <a:extLst>
               <a:ext uri="{91240B29-F687-4f45-9708-019B960494DF}">
-                <a14:hiddenLine xmlns:a14="http://schemas.microsoft.com/office/drawing/2010/main" xmlns="" w="9525">
+                <a14:hiddenLine xmlns="" xmlns:a14="http://schemas.microsoft.com/office/drawing/2010/main" w="9525">
                   <a:solidFill>
                     <a:srgbClr val="000000"/>
                   </a:solidFill>
@@ -2573,7 +2573,7 @@
             </a:ln>
             <a:extLst>
               <a:ext uri="{91240B29-F687-4f45-9708-019B960494DF}">
-                <a14:hiddenLine xmlns:a14="http://schemas.microsoft.com/office/drawing/2010/main" xmlns="" w="9525">
+                <a14:hiddenLine xmlns="" xmlns:a14="http://schemas.microsoft.com/office/drawing/2010/main" w="9525">
                   <a:solidFill>
                     <a:srgbClr val="000000"/>
                   </a:solidFill>
@@ -2663,7 +2663,7 @@
             </a:ln>
             <a:extLst>
               <a:ext uri="{91240B29-F687-4f45-9708-019B960494DF}">
-                <a14:hiddenLine xmlns:a14="http://schemas.microsoft.com/office/drawing/2010/main" xmlns="" w="9525">
+                <a14:hiddenLine xmlns="" xmlns:a14="http://schemas.microsoft.com/office/drawing/2010/main" w="9525">
                   <a:solidFill>
                     <a:srgbClr val="000000"/>
                   </a:solidFill>
@@ -2731,7 +2731,7 @@
             </a:ln>
             <a:extLst>
               <a:ext uri="{91240B29-F687-4f45-9708-019B960494DF}">
-                <a14:hiddenLine xmlns:a14="http://schemas.microsoft.com/office/drawing/2010/main" xmlns="" w="9525">
+                <a14:hiddenLine xmlns="" xmlns:a14="http://schemas.microsoft.com/office/drawing/2010/main" w="9525">
                   <a:solidFill>
                     <a:srgbClr val="000000"/>
                   </a:solidFill>
@@ -2793,7 +2793,7 @@
             </a:ln>
             <a:extLst>
               <a:ext uri="{91240B29-F687-4f45-9708-019B960494DF}">
-                <a14:hiddenLine xmlns:a14="http://schemas.microsoft.com/office/drawing/2010/main" xmlns="" w="9525">
+                <a14:hiddenLine xmlns="" xmlns:a14="http://schemas.microsoft.com/office/drawing/2010/main" w="9525">
                   <a:solidFill>
                     <a:srgbClr val="000000"/>
                   </a:solidFill>
@@ -2883,7 +2883,7 @@
             </a:ln>
             <a:extLst>
               <a:ext uri="{91240B29-F687-4f45-9708-019B960494DF}">
-                <a14:hiddenLine xmlns:a14="http://schemas.microsoft.com/office/drawing/2010/main" xmlns="" w="9525">
+                <a14:hiddenLine xmlns="" xmlns:a14="http://schemas.microsoft.com/office/drawing/2010/main" w="9525">
                   <a:solidFill>
                     <a:srgbClr val="000000"/>
                   </a:solidFill>
@@ -2945,7 +2945,7 @@
             </a:ln>
             <a:extLst>
               <a:ext uri="{91240B29-F687-4f45-9708-019B960494DF}">
-                <a14:hiddenLine xmlns:a14="http://schemas.microsoft.com/office/drawing/2010/main" xmlns="" w="9525">
+                <a14:hiddenLine xmlns="" xmlns:a14="http://schemas.microsoft.com/office/drawing/2010/main" w="9525">
                   <a:solidFill>
                     <a:srgbClr val="000000"/>
                   </a:solidFill>
@@ -3035,7 +3035,7 @@
             </a:ln>
             <a:extLst>
               <a:ext uri="{91240B29-F687-4f45-9708-019B960494DF}">
-                <a14:hiddenLine xmlns:a14="http://schemas.microsoft.com/office/drawing/2010/main" xmlns="" w="9525">
+                <a14:hiddenLine xmlns="" xmlns:a14="http://schemas.microsoft.com/office/drawing/2010/main" w="9525">
                   <a:solidFill>
                     <a:srgbClr val="000000"/>
                   </a:solidFill>
@@ -3097,7 +3097,7 @@
             </a:ln>
             <a:extLst>
               <a:ext uri="{91240B29-F687-4f45-9708-019B960494DF}">
-                <a14:hiddenLine xmlns:a14="http://schemas.microsoft.com/office/drawing/2010/main" xmlns="" w="9525">
+                <a14:hiddenLine xmlns="" xmlns:a14="http://schemas.microsoft.com/office/drawing/2010/main" w="9525">
                   <a:solidFill>
                     <a:srgbClr val="000000"/>
                   </a:solidFill>
@@ -3187,7 +3187,7 @@
             </a:ln>
             <a:extLst>
               <a:ext uri="{91240B29-F687-4f45-9708-019B960494DF}">
-                <a14:hiddenLine xmlns:a14="http://schemas.microsoft.com/office/drawing/2010/main" xmlns="" w="9525">
+                <a14:hiddenLine xmlns="" xmlns:a14="http://schemas.microsoft.com/office/drawing/2010/main" w="9525">
                   <a:solidFill>
                     <a:srgbClr val="000000"/>
                   </a:solidFill>
@@ -3221,7 +3221,7 @@
             </a:ln>
             <a:extLst>
               <a:ext uri="{91240B29-F687-4f45-9708-019B960494DF}">
-                <a14:hiddenLine xmlns:a14="http://schemas.microsoft.com/office/drawing/2010/main" xmlns="" w="9525">
+                <a14:hiddenLine xmlns="" xmlns:a14="http://schemas.microsoft.com/office/drawing/2010/main" w="9525">
                   <a:solidFill>
                     <a:srgbClr val="000000"/>
                   </a:solidFill>
@@ -3286,7 +3286,7 @@
             </a:ln>
             <a:extLst>
               <a:ext uri="{91240B29-F687-4f45-9708-019B960494DF}">
-                <a14:hiddenLine xmlns:a14="http://schemas.microsoft.com/office/drawing/2010/main" xmlns="" w="9525">
+                <a14:hiddenLine xmlns="" xmlns:a14="http://schemas.microsoft.com/office/drawing/2010/main" w="9525">
                   <a:solidFill>
                     <a:srgbClr val="000000"/>
                   </a:solidFill>
@@ -3376,7 +3376,7 @@
             </a:ln>
             <a:extLst>
               <a:ext uri="{91240B29-F687-4f45-9708-019B960494DF}">
-                <a14:hiddenLine xmlns:a14="http://schemas.microsoft.com/office/drawing/2010/main" xmlns="" w="9525">
+                <a14:hiddenLine xmlns="" xmlns:a14="http://schemas.microsoft.com/office/drawing/2010/main" w="9525">
                   <a:solidFill>
                     <a:srgbClr val="000000"/>
                   </a:solidFill>
@@ -3438,7 +3438,7 @@
             </a:ln>
             <a:extLst>
               <a:ext uri="{91240B29-F687-4f45-9708-019B960494DF}">
-                <a14:hiddenLine xmlns:a14="http://schemas.microsoft.com/office/drawing/2010/main" xmlns="" w="9525">
+                <a14:hiddenLine xmlns="" xmlns:a14="http://schemas.microsoft.com/office/drawing/2010/main" w="9525">
                   <a:solidFill>
                     <a:srgbClr val="000000"/>
                   </a:solidFill>
@@ -3528,7 +3528,7 @@
             </a:ln>
             <a:extLst>
               <a:ext uri="{91240B29-F687-4f45-9708-019B960494DF}">
-                <a14:hiddenLine xmlns:a14="http://schemas.microsoft.com/office/drawing/2010/main" xmlns="" w="9525">
+                <a14:hiddenLine xmlns="" xmlns:a14="http://schemas.microsoft.com/office/drawing/2010/main" w="9525">
                   <a:solidFill>
                     <a:srgbClr val="000000"/>
                   </a:solidFill>
@@ -3618,7 +3618,7 @@
             </a:ln>
             <a:extLst>
               <a:ext uri="{91240B29-F687-4f45-9708-019B960494DF}">
-                <a14:hiddenLine xmlns:a14="http://schemas.microsoft.com/office/drawing/2010/main" xmlns="" w="9525">
+                <a14:hiddenLine xmlns="" xmlns:a14="http://schemas.microsoft.com/office/drawing/2010/main" w="9525">
                   <a:solidFill>
                     <a:srgbClr val="000000"/>
                   </a:solidFill>
@@ -3683,7 +3683,7 @@
             </a:ln>
             <a:extLst>
               <a:ext uri="{91240B29-F687-4f45-9708-019B960494DF}">
-                <a14:hiddenLine xmlns:a14="http://schemas.microsoft.com/office/drawing/2010/main" xmlns="" w="9525">
+                <a14:hiddenLine xmlns="" xmlns:a14="http://schemas.microsoft.com/office/drawing/2010/main" w="9525">
                   <a:solidFill>
                     <a:srgbClr val="000000"/>
                   </a:solidFill>
@@ -3745,7 +3745,7 @@
             </a:ln>
             <a:extLst>
               <a:ext uri="{91240B29-F687-4f45-9708-019B960494DF}">
-                <a14:hiddenLine xmlns:a14="http://schemas.microsoft.com/office/drawing/2010/main" xmlns="" w="9525">
+                <a14:hiddenLine xmlns="" xmlns:a14="http://schemas.microsoft.com/office/drawing/2010/main" w="9525">
                   <a:solidFill>
                     <a:srgbClr val="000000"/>
                   </a:solidFill>
@@ -3835,7 +3835,7 @@
             </a:ln>
             <a:extLst>
               <a:ext uri="{91240B29-F687-4f45-9708-019B960494DF}">
-                <a14:hiddenLine xmlns:a14="http://schemas.microsoft.com/office/drawing/2010/main" xmlns="" w="9525">
+                <a14:hiddenLine xmlns="" xmlns:a14="http://schemas.microsoft.com/office/drawing/2010/main" w="9525">
                   <a:solidFill>
                     <a:srgbClr val="000000"/>
                   </a:solidFill>
@@ -3925,7 +3925,7 @@
             </a:ln>
             <a:extLst>
               <a:ext uri="{91240B29-F687-4f45-9708-019B960494DF}">
-                <a14:hiddenLine xmlns:a14="http://schemas.microsoft.com/office/drawing/2010/main" xmlns="" w="9525">
+                <a14:hiddenLine xmlns="" xmlns:a14="http://schemas.microsoft.com/office/drawing/2010/main" w="9525">
                   <a:solidFill>
                     <a:srgbClr val="000000"/>
                   </a:solidFill>
@@ -3987,7 +3987,7 @@
             </a:ln>
             <a:extLst>
               <a:ext uri="{91240B29-F687-4f45-9708-019B960494DF}">
-                <a14:hiddenLine xmlns:a14="http://schemas.microsoft.com/office/drawing/2010/main" xmlns="" w="9525">
+                <a14:hiddenLine xmlns="" xmlns:a14="http://schemas.microsoft.com/office/drawing/2010/main" w="9525">
                   <a:solidFill>
                     <a:srgbClr val="000000"/>
                   </a:solidFill>
@@ -4107,7 +4107,7 @@
             </a:ln>
             <a:extLst>
               <a:ext uri="{91240B29-F687-4f45-9708-019B960494DF}">
-                <a14:hiddenLine xmlns:a14="http://schemas.microsoft.com/office/drawing/2010/main" xmlns="" w="9525">
+                <a14:hiddenLine xmlns="" xmlns:a14="http://schemas.microsoft.com/office/drawing/2010/main" w="9525">
                   <a:solidFill>
                     <a:srgbClr val="000000"/>
                   </a:solidFill>
@@ -4175,7 +4175,7 @@
             </a:ln>
             <a:extLst>
               <a:ext uri="{91240B29-F687-4f45-9708-019B960494DF}">
-                <a14:hiddenLine xmlns:a14="http://schemas.microsoft.com/office/drawing/2010/main" xmlns="" w="9525">
+                <a14:hiddenLine xmlns="" xmlns:a14="http://schemas.microsoft.com/office/drawing/2010/main" w="9525">
                   <a:solidFill>
                     <a:srgbClr val="000000"/>
                   </a:solidFill>
@@ -4265,7 +4265,7 @@
             </a:ln>
             <a:extLst>
               <a:ext uri="{91240B29-F687-4f45-9708-019B960494DF}">
-                <a14:hiddenLine xmlns:a14="http://schemas.microsoft.com/office/drawing/2010/main" xmlns="" w="9525">
+                <a14:hiddenLine xmlns="" xmlns:a14="http://schemas.microsoft.com/office/drawing/2010/main" w="9525">
                   <a:solidFill>
                     <a:srgbClr val="000000"/>
                   </a:solidFill>
@@ -9079,7 +9079,7 @@
           <a:noFill/>
           <a:extLst>
             <a:ext uri="{909E8E84-426E-40dd-AFC4-6F175D3DCCD1}">
-              <a14:hiddenFill xmlns:a14="http://schemas.microsoft.com/office/drawing/2010/main" xmlns="">
+              <a14:hiddenFill xmlns="" xmlns:a14="http://schemas.microsoft.com/office/drawing/2010/main">
                 <a:solidFill>
                   <a:srgbClr val="FFFFFF"/>
                 </a:solidFill>
@@ -9153,7 +9153,7 @@
               </a:ln>
               <a:extLst>
                 <a:ext uri="{91240B29-F687-4f45-9708-019B960494DF}">
-                  <a14:hiddenLine xmlns:a14="http://schemas.microsoft.com/office/drawing/2010/main" xmlns="" w="9525">
+                  <a14:hiddenLine xmlns="" xmlns:a14="http://schemas.microsoft.com/office/drawing/2010/main" w="9525">
                     <a:solidFill>
                       <a:srgbClr val="000000"/>
                     </a:solidFill>
@@ -9243,7 +9243,7 @@
               </a:ln>
               <a:extLst>
                 <a:ext uri="{91240B29-F687-4f45-9708-019B960494DF}">
-                  <a14:hiddenLine xmlns:a14="http://schemas.microsoft.com/office/drawing/2010/main" xmlns="" w="9525">
+                  <a14:hiddenLine xmlns="" xmlns:a14="http://schemas.microsoft.com/office/drawing/2010/main" w="9525">
                     <a:solidFill>
                       <a:srgbClr val="000000"/>
                     </a:solidFill>
@@ -9333,7 +9333,7 @@
               </a:ln>
               <a:extLst>
                 <a:ext uri="{91240B29-F687-4f45-9708-019B960494DF}">
-                  <a14:hiddenLine xmlns:a14="http://schemas.microsoft.com/office/drawing/2010/main" xmlns="" w="9525">
+                  <a14:hiddenLine xmlns="" xmlns:a14="http://schemas.microsoft.com/office/drawing/2010/main" w="9525">
                     <a:solidFill>
                       <a:srgbClr val="000000"/>
                     </a:solidFill>
@@ -9395,7 +9395,7 @@
               </a:ln>
               <a:extLst>
                 <a:ext uri="{91240B29-F687-4f45-9708-019B960494DF}">
-                  <a14:hiddenLine xmlns:a14="http://schemas.microsoft.com/office/drawing/2010/main" xmlns="" w="9525">
+                  <a14:hiddenLine xmlns="" xmlns:a14="http://schemas.microsoft.com/office/drawing/2010/main" w="9525">
                     <a:solidFill>
                       <a:srgbClr val="000000"/>
                     </a:solidFill>
@@ -9485,7 +9485,7 @@
               </a:ln>
               <a:extLst>
                 <a:ext uri="{91240B29-F687-4f45-9708-019B960494DF}">
-                  <a14:hiddenLine xmlns:a14="http://schemas.microsoft.com/office/drawing/2010/main" xmlns="" w="9525">
+                  <a14:hiddenLine xmlns="" xmlns:a14="http://schemas.microsoft.com/office/drawing/2010/main" w="9525">
                     <a:solidFill>
                       <a:srgbClr val="000000"/>
                     </a:solidFill>
@@ -9547,7 +9547,7 @@
               </a:ln>
               <a:extLst>
                 <a:ext uri="{91240B29-F687-4f45-9708-019B960494DF}">
-                  <a14:hiddenLine xmlns:a14="http://schemas.microsoft.com/office/drawing/2010/main" xmlns="" w="9525">
+                  <a14:hiddenLine xmlns="" xmlns:a14="http://schemas.microsoft.com/office/drawing/2010/main" w="9525">
                     <a:solidFill>
                       <a:srgbClr val="000000"/>
                     </a:solidFill>
@@ -9609,7 +9609,7 @@
               </a:ln>
               <a:extLst>
                 <a:ext uri="{91240B29-F687-4f45-9708-019B960494DF}">
-                  <a14:hiddenLine xmlns:a14="http://schemas.microsoft.com/office/drawing/2010/main" xmlns="" w="9525">
+                  <a14:hiddenLine xmlns="" xmlns:a14="http://schemas.microsoft.com/office/drawing/2010/main" w="9525">
                     <a:solidFill>
                       <a:srgbClr val="000000"/>
                     </a:solidFill>
@@ -9699,7 +9699,7 @@
               </a:ln>
               <a:extLst>
                 <a:ext uri="{91240B29-F687-4f45-9708-019B960494DF}">
-                  <a14:hiddenLine xmlns:a14="http://schemas.microsoft.com/office/drawing/2010/main" xmlns="" w="9525">
+                  <a14:hiddenLine xmlns="" xmlns:a14="http://schemas.microsoft.com/office/drawing/2010/main" w="9525">
                     <a:solidFill>
                       <a:srgbClr val="000000"/>
                     </a:solidFill>
@@ -9789,7 +9789,7 @@
               </a:ln>
               <a:extLst>
                 <a:ext uri="{91240B29-F687-4f45-9708-019B960494DF}">
-                  <a14:hiddenLine xmlns:a14="http://schemas.microsoft.com/office/drawing/2010/main" xmlns="" w="9525">
+                  <a14:hiddenLine xmlns="" xmlns:a14="http://schemas.microsoft.com/office/drawing/2010/main" w="9525">
                     <a:solidFill>
                       <a:srgbClr val="000000"/>
                     </a:solidFill>
@@ -9851,7 +9851,7 @@
               </a:ln>
               <a:extLst>
                 <a:ext uri="{91240B29-F687-4f45-9708-019B960494DF}">
-                  <a14:hiddenLine xmlns:a14="http://schemas.microsoft.com/office/drawing/2010/main" xmlns="" w="9525">
+                  <a14:hiddenLine xmlns="" xmlns:a14="http://schemas.microsoft.com/office/drawing/2010/main" w="9525">
                     <a:solidFill>
                       <a:srgbClr val="000000"/>
                     </a:solidFill>
@@ -9961,7 +9961,7 @@
               </a:ln>
               <a:extLst>
                 <a:ext uri="{91240B29-F687-4f45-9708-019B960494DF}">
-                  <a14:hiddenLine xmlns:a14="http://schemas.microsoft.com/office/drawing/2010/main" xmlns="" w="9525">
+                  <a14:hiddenLine xmlns="" xmlns:a14="http://schemas.microsoft.com/office/drawing/2010/main" w="9525">
                     <a:solidFill>
                       <a:srgbClr val="000000"/>
                     </a:solidFill>
@@ -10045,7 +10045,7 @@
               </a:ln>
               <a:extLst>
                 <a:ext uri="{91240B29-F687-4f45-9708-019B960494DF}">
-                  <a14:hiddenLine xmlns:a14="http://schemas.microsoft.com/office/drawing/2010/main" xmlns="" w="9525">
+                  <a14:hiddenLine xmlns="" xmlns:a14="http://schemas.microsoft.com/office/drawing/2010/main" w="9525">
                     <a:solidFill>
                       <a:srgbClr val="000000"/>
                     </a:solidFill>
@@ -10107,7 +10107,7 @@
               </a:ln>
               <a:extLst>
                 <a:ext uri="{91240B29-F687-4f45-9708-019B960494DF}">
-                  <a14:hiddenLine xmlns:a14="http://schemas.microsoft.com/office/drawing/2010/main" xmlns="" w="9525">
+                  <a14:hiddenLine xmlns="" xmlns:a14="http://schemas.microsoft.com/office/drawing/2010/main" w="9525">
                     <a:solidFill>
                       <a:srgbClr val="000000"/>
                     </a:solidFill>
@@ -10169,7 +10169,7 @@
               </a:ln>
               <a:extLst>
                 <a:ext uri="{91240B29-F687-4f45-9708-019B960494DF}">
-                  <a14:hiddenLine xmlns:a14="http://schemas.microsoft.com/office/drawing/2010/main" xmlns="" w="9525">
+                  <a14:hiddenLine xmlns="" xmlns:a14="http://schemas.microsoft.com/office/drawing/2010/main" w="9525">
                     <a:solidFill>
                       <a:srgbClr val="000000"/>
                     </a:solidFill>
@@ -10259,7 +10259,7 @@
               </a:ln>
               <a:extLst>
                 <a:ext uri="{91240B29-F687-4f45-9708-019B960494DF}">
-                  <a14:hiddenLine xmlns:a14="http://schemas.microsoft.com/office/drawing/2010/main" xmlns="" w="9525">
+                  <a14:hiddenLine xmlns="" xmlns:a14="http://schemas.microsoft.com/office/drawing/2010/main" w="9525">
                     <a:solidFill>
                       <a:srgbClr val="000000"/>
                     </a:solidFill>
@@ -10293,7 +10293,7 @@
               </a:ln>
               <a:extLst>
                 <a:ext uri="{91240B29-F687-4f45-9708-019B960494DF}">
-                  <a14:hiddenLine xmlns:a14="http://schemas.microsoft.com/office/drawing/2010/main" xmlns="" w="9525">
+                  <a14:hiddenLine xmlns="" xmlns:a14="http://schemas.microsoft.com/office/drawing/2010/main" w="9525">
                     <a:solidFill>
                       <a:srgbClr val="000000"/>
                     </a:solidFill>
@@ -10358,7 +10358,7 @@
               </a:ln>
               <a:extLst>
                 <a:ext uri="{91240B29-F687-4f45-9708-019B960494DF}">
-                  <a14:hiddenLine xmlns:a14="http://schemas.microsoft.com/office/drawing/2010/main" xmlns="" w="9525">
+                  <a14:hiddenLine xmlns="" xmlns:a14="http://schemas.microsoft.com/office/drawing/2010/main" w="9525">
                     <a:solidFill>
                       <a:srgbClr val="000000"/>
                     </a:solidFill>
@@ -10448,7 +10448,7 @@
               </a:ln>
               <a:extLst>
                 <a:ext uri="{91240B29-F687-4f45-9708-019B960494DF}">
-                  <a14:hiddenLine xmlns:a14="http://schemas.microsoft.com/office/drawing/2010/main" xmlns="" w="9525">
+                  <a14:hiddenLine xmlns="" xmlns:a14="http://schemas.microsoft.com/office/drawing/2010/main" w="9525">
                     <a:solidFill>
                       <a:srgbClr val="000000"/>
                     </a:solidFill>
@@ -10510,7 +10510,7 @@
               </a:ln>
               <a:extLst>
                 <a:ext uri="{91240B29-F687-4f45-9708-019B960494DF}">
-                  <a14:hiddenLine xmlns:a14="http://schemas.microsoft.com/office/drawing/2010/main" xmlns="" w="9525">
+                  <a14:hiddenLine xmlns="" xmlns:a14="http://schemas.microsoft.com/office/drawing/2010/main" w="9525">
                     <a:solidFill>
                       <a:srgbClr val="000000"/>
                     </a:solidFill>
@@ -10600,7 +10600,7 @@
               </a:ln>
               <a:extLst>
                 <a:ext uri="{91240B29-F687-4f45-9708-019B960494DF}">
-                  <a14:hiddenLine xmlns:a14="http://schemas.microsoft.com/office/drawing/2010/main" xmlns="" w="9525">
+                  <a14:hiddenLine xmlns="" xmlns:a14="http://schemas.microsoft.com/office/drawing/2010/main" w="9525">
                     <a:solidFill>
                       <a:srgbClr val="000000"/>
                     </a:solidFill>
@@ -10665,7 +10665,7 @@
               </a:ln>
               <a:extLst>
                 <a:ext uri="{91240B29-F687-4f45-9708-019B960494DF}">
-                  <a14:hiddenLine xmlns:a14="http://schemas.microsoft.com/office/drawing/2010/main" xmlns="" w="9525">
+                  <a14:hiddenLine xmlns="" xmlns:a14="http://schemas.microsoft.com/office/drawing/2010/main" w="9525">
                     <a:solidFill>
                       <a:srgbClr val="000000"/>
                     </a:solidFill>
@@ -10727,7 +10727,7 @@
               </a:ln>
               <a:extLst>
                 <a:ext uri="{91240B29-F687-4f45-9708-019B960494DF}">
-                  <a14:hiddenLine xmlns:a14="http://schemas.microsoft.com/office/drawing/2010/main" xmlns="" w="9525">
+                  <a14:hiddenLine xmlns="" xmlns:a14="http://schemas.microsoft.com/office/drawing/2010/main" w="9525">
                     <a:solidFill>
                       <a:srgbClr val="000000"/>
                     </a:solidFill>
@@ -10817,7 +10817,7 @@
               </a:ln>
               <a:extLst>
                 <a:ext uri="{91240B29-F687-4f45-9708-019B960494DF}">
-                  <a14:hiddenLine xmlns:a14="http://schemas.microsoft.com/office/drawing/2010/main" xmlns="" w="9525">
+                  <a14:hiddenLine xmlns="" xmlns:a14="http://schemas.microsoft.com/office/drawing/2010/main" w="9525">
                     <a:solidFill>
                       <a:srgbClr val="000000"/>
                     </a:solidFill>
@@ -10907,7 +10907,7 @@
               </a:ln>
               <a:extLst>
                 <a:ext uri="{91240B29-F687-4f45-9708-019B960494DF}">
-                  <a14:hiddenLine xmlns:a14="http://schemas.microsoft.com/office/drawing/2010/main" xmlns="" w="9525">
+                  <a14:hiddenLine xmlns="" xmlns:a14="http://schemas.microsoft.com/office/drawing/2010/main" w="9525">
                     <a:solidFill>
                       <a:srgbClr val="000000"/>
                     </a:solidFill>
@@ -10972,7 +10972,7 @@
               </a:ln>
               <a:extLst>
                 <a:ext uri="{91240B29-F687-4f45-9708-019B960494DF}">
-                  <a14:hiddenLine xmlns:a14="http://schemas.microsoft.com/office/drawing/2010/main" xmlns="" w="9525">
+                  <a14:hiddenLine xmlns="" xmlns:a14="http://schemas.microsoft.com/office/drawing/2010/main" w="9525">
                     <a:solidFill>
                       <a:srgbClr val="000000"/>
                     </a:solidFill>
@@ -11092,7 +11092,7 @@
               </a:ln>
               <a:extLst>
                 <a:ext uri="{91240B29-F687-4f45-9708-019B960494DF}">
-                  <a14:hiddenLine xmlns:a14="http://schemas.microsoft.com/office/drawing/2010/main" xmlns="" w="9525">
+                  <a14:hiddenLine xmlns="" xmlns:a14="http://schemas.microsoft.com/office/drawing/2010/main" w="9525">
                     <a:solidFill>
                       <a:srgbClr val="000000"/>
                     </a:solidFill>
@@ -11173,7 +11173,7 @@
               </a:ln>
               <a:extLst>
                 <a:ext uri="{91240B29-F687-4f45-9708-019B960494DF}">
-                  <a14:hiddenLine xmlns:a14="http://schemas.microsoft.com/office/drawing/2010/main" xmlns="" w="9525">
+                  <a14:hiddenLine xmlns="" xmlns:a14="http://schemas.microsoft.com/office/drawing/2010/main" w="9525">
                     <a:solidFill>
                       <a:srgbClr val="000000"/>
                     </a:solidFill>
@@ -11288,7 +11288,7 @@
               </a:ln>
               <a:extLst>
                 <a:ext uri="{91240B29-F687-4f45-9708-019B960494DF}">
-                  <a14:hiddenLine xmlns:a14="http://schemas.microsoft.com/office/drawing/2010/main" xmlns="" w="9525">
+                  <a14:hiddenLine xmlns="" xmlns:a14="http://schemas.microsoft.com/office/drawing/2010/main" w="9525">
                     <a:solidFill>
                       <a:srgbClr val="000000"/>
                     </a:solidFill>
@@ -11378,7 +11378,7 @@
               </a:ln>
               <a:extLst>
                 <a:ext uri="{91240B29-F687-4f45-9708-019B960494DF}">
-                  <a14:hiddenLine xmlns:a14="http://schemas.microsoft.com/office/drawing/2010/main" xmlns="" w="9525">
+                  <a14:hiddenLine xmlns="" xmlns:a14="http://schemas.microsoft.com/office/drawing/2010/main" w="9525">
                     <a:solidFill>
                       <a:srgbClr val="000000"/>
                     </a:solidFill>
@@ -11443,7 +11443,7 @@
               </a:ln>
               <a:extLst>
                 <a:ext uri="{91240B29-F687-4f45-9708-019B960494DF}">
-                  <a14:hiddenLine xmlns:a14="http://schemas.microsoft.com/office/drawing/2010/main" xmlns="" w="9525">
+                  <a14:hiddenLine xmlns="" xmlns:a14="http://schemas.microsoft.com/office/drawing/2010/main" w="9525">
                     <a:solidFill>
                       <a:srgbClr val="000000"/>
                     </a:solidFill>
@@ -11533,7 +11533,7 @@
               </a:ln>
               <a:extLst>
                 <a:ext uri="{91240B29-F687-4f45-9708-019B960494DF}">
-                  <a14:hiddenLine xmlns:a14="http://schemas.microsoft.com/office/drawing/2010/main" xmlns="" w="9525">
+                  <a14:hiddenLine xmlns="" xmlns:a14="http://schemas.microsoft.com/office/drawing/2010/main" w="9525">
                     <a:solidFill>
                       <a:srgbClr val="000000"/>
                     </a:solidFill>
@@ -11601,7 +11601,7 @@
               </a:ln>
               <a:extLst>
                 <a:ext uri="{91240B29-F687-4f45-9708-019B960494DF}">
-                  <a14:hiddenLine xmlns:a14="http://schemas.microsoft.com/office/drawing/2010/main" xmlns="" w="9525">
+                  <a14:hiddenLine xmlns="" xmlns:a14="http://schemas.microsoft.com/office/drawing/2010/main" w="9525">
                     <a:solidFill>
                       <a:srgbClr val="000000"/>
                     </a:solidFill>
@@ -11691,7 +11691,7 @@
               </a:ln>
               <a:extLst>
                 <a:ext uri="{91240B29-F687-4f45-9708-019B960494DF}">
-                  <a14:hiddenLine xmlns:a14="http://schemas.microsoft.com/office/drawing/2010/main" xmlns="" w="9525">
+                  <a14:hiddenLine xmlns="" xmlns:a14="http://schemas.microsoft.com/office/drawing/2010/main" w="9525">
                     <a:solidFill>
                       <a:srgbClr val="000000"/>
                     </a:solidFill>
@@ -11759,7 +11759,7 @@
               </a:ln>
               <a:extLst>
                 <a:ext uri="{91240B29-F687-4f45-9708-019B960494DF}">
-                  <a14:hiddenLine xmlns:a14="http://schemas.microsoft.com/office/drawing/2010/main" xmlns="" w="9525">
+                  <a14:hiddenLine xmlns="" xmlns:a14="http://schemas.microsoft.com/office/drawing/2010/main" w="9525">
                     <a:solidFill>
                       <a:srgbClr val="000000"/>
                     </a:solidFill>
@@ -11849,7 +11849,7 @@
               </a:ln>
               <a:extLst>
                 <a:ext uri="{91240B29-F687-4f45-9708-019B960494DF}">
-                  <a14:hiddenLine xmlns:a14="http://schemas.microsoft.com/office/drawing/2010/main" xmlns="" w="9525">
+                  <a14:hiddenLine xmlns="" xmlns:a14="http://schemas.microsoft.com/office/drawing/2010/main" w="9525">
                     <a:solidFill>
                       <a:srgbClr val="000000"/>
                     </a:solidFill>
@@ -11883,7 +11883,7 @@
               </a:ln>
               <a:extLst>
                 <a:ext uri="{91240B29-F687-4f45-9708-019B960494DF}">
-                  <a14:hiddenLine xmlns:a14="http://schemas.microsoft.com/office/drawing/2010/main" xmlns="" w="9525">
+                  <a14:hiddenLine xmlns="" xmlns:a14="http://schemas.microsoft.com/office/drawing/2010/main" w="9525">
                     <a:solidFill>
                       <a:srgbClr val="000000"/>
                     </a:solidFill>
@@ -12752,7 +12752,7 @@
         </p:nvSpPr>
         <p:spPr>
           <a:xfrm>
-            <a:off x="692009" y="2843647"/>
+            <a:off x="559273" y="1501543"/>
             <a:ext cx="4260184" cy="369332"/>
           </a:xfrm>
           <a:prstGeom prst="rect">
@@ -12774,53 +12774,6 @@
           </a:p>
         </p:txBody>
       </p:sp>
-      <p:pic>
-        <p:nvPicPr>
-          <p:cNvPr id="1026" name="Picture 2" descr="pandas (software) - Wikipedia">
-            <a:extLst>
-              <a:ext uri="{FF2B5EF4-FFF2-40B4-BE49-F238E27FC236}">
-                <a16:creationId xmlns:a16="http://schemas.microsoft.com/office/drawing/2014/main" id="{5735E0C7-7654-7A0A-81EC-406CC0ABA480}"/>
-              </a:ext>
-            </a:extLst>
-          </p:cNvPr>
-          <p:cNvPicPr>
-            <a:picLocks noChangeAspect="1" noChangeArrowheads="1"/>
-          </p:cNvPicPr>
-          <p:nvPr/>
-        </p:nvPicPr>
-        <p:blipFill>
-          <a:blip r:embed="rId2">
-            <a:extLst>
-              <a:ext uri="{28A0092B-C50C-407E-A947-70E740481C1C}">
-                <a14:useLocalDpi xmlns:a14="http://schemas.microsoft.com/office/drawing/2010/main" val="0"/>
-              </a:ext>
-            </a:extLst>
-          </a:blip>
-          <a:srcRect/>
-          <a:stretch>
-            <a:fillRect/>
-          </a:stretch>
-        </p:blipFill>
-        <p:spPr bwMode="auto">
-          <a:xfrm>
-            <a:off x="662581" y="1203883"/>
-            <a:ext cx="3673376" cy="1484656"/>
-          </a:xfrm>
-          <a:prstGeom prst="rect">
-            <a:avLst/>
-          </a:prstGeom>
-          <a:noFill/>
-          <a:extLst>
-            <a:ext uri="{909E8E84-426E-40DD-AFC4-6F175D3DCCD1}">
-              <a14:hiddenFill xmlns:a14="http://schemas.microsoft.com/office/drawing/2010/main">
-                <a:solidFill>
-                  <a:srgbClr val="FFFFFF"/>
-                </a:solidFill>
-              </a14:hiddenFill>
-            </a:ext>
-          </a:extLst>
-        </p:spPr>
-      </p:pic>
     </p:spTree>
     <p:extLst>
       <p:ext uri="{BB962C8B-B14F-4D97-AF65-F5344CB8AC3E}">
@@ -13423,8 +13376,8 @@
         </p:nvSpPr>
         <p:spPr>
           <a:xfrm>
-            <a:off x="773723" y="1744394"/>
-            <a:ext cx="11010707" cy="3785652"/>
+            <a:off x="590645" y="1048775"/>
+            <a:ext cx="11010707" cy="5940088"/>
           </a:xfrm>
           <a:prstGeom prst="rect">
             <a:avLst/>
@@ -13432,7 +13385,7 @@
           <a:noFill/>
         </p:spPr>
         <p:txBody>
-          <a:bodyPr wrap="none" rtlCol="0">
+          <a:bodyPr wrap="square" rtlCol="0">
             <a:spAutoFit/>
           </a:bodyPr>
           <a:lstStyle/>

</xml_diff>

<commit_message>
mejoras en las conclusiones
</commit_message>
<xml_diff>
--- a/PROYECTO-MACHINE-LEARNING.pptx
+++ b/PROYECTO-MACHINE-LEARNING.pptx
@@ -309,7 +309,7 @@
           <a:p>
             <a:fld id="{B17FED09-996A-4092-B0CE-C688A8E76C69}" type="datetimeFigureOut">
               <a:rPr lang="es-ES" smtClean="0"/>
-              <a:t>20/02/2024</a:t>
+              <a:t>22/02/2024</a:t>
             </a:fld>
             <a:endParaRPr lang="es-ES"/>
           </a:p>
@@ -584,7 +584,7 @@
           <a:p>
             <a:fld id="{B17FED09-996A-4092-B0CE-C688A8E76C69}" type="datetimeFigureOut">
               <a:rPr lang="es-ES" smtClean="0"/>
-              <a:t>20/02/2024</a:t>
+              <a:t>22/02/2024</a:t>
             </a:fld>
             <a:endParaRPr lang="es-ES"/>
           </a:p>
@@ -778,7 +778,7 @@
           <a:p>
             <a:fld id="{B17FED09-996A-4092-B0CE-C688A8E76C69}" type="datetimeFigureOut">
               <a:rPr lang="es-ES" smtClean="0"/>
-              <a:t>20/02/2024</a:t>
+              <a:t>22/02/2024</a:t>
             </a:fld>
             <a:endParaRPr lang="es-ES"/>
           </a:p>
@@ -1051,7 +1051,7 @@
           <a:p>
             <a:fld id="{B17FED09-996A-4092-B0CE-C688A8E76C69}" type="datetimeFigureOut">
               <a:rPr lang="es-ES" smtClean="0"/>
-              <a:t>20/02/2024</a:t>
+              <a:t>22/02/2024</a:t>
             </a:fld>
             <a:endParaRPr lang="es-ES"/>
           </a:p>
@@ -1392,7 +1392,7 @@
           <a:p>
             <a:fld id="{B17FED09-996A-4092-B0CE-C688A8E76C69}" type="datetimeFigureOut">
               <a:rPr lang="es-ES" smtClean="0"/>
-              <a:t>20/02/2024</a:t>
+              <a:t>22/02/2024</a:t>
             </a:fld>
             <a:endParaRPr lang="es-ES"/>
           </a:p>
@@ -2015,7 +2015,7 @@
           <a:p>
             <a:fld id="{B17FED09-996A-4092-B0CE-C688A8E76C69}" type="datetimeFigureOut">
               <a:rPr lang="es-ES" smtClean="0"/>
-              <a:t>20/02/2024</a:t>
+              <a:t>22/02/2024</a:t>
             </a:fld>
             <a:endParaRPr lang="es-ES"/>
           </a:p>
@@ -2875,7 +2875,7 @@
           <a:p>
             <a:fld id="{B17FED09-996A-4092-B0CE-C688A8E76C69}" type="datetimeFigureOut">
               <a:rPr lang="es-ES" smtClean="0"/>
-              <a:t>20/02/2024</a:t>
+              <a:t>22/02/2024</a:t>
             </a:fld>
             <a:endParaRPr lang="es-ES"/>
           </a:p>
@@ -3045,7 +3045,7 @@
           <a:p>
             <a:fld id="{B17FED09-996A-4092-B0CE-C688A8E76C69}" type="datetimeFigureOut">
               <a:rPr lang="es-ES" smtClean="0"/>
-              <a:t>20/02/2024</a:t>
+              <a:t>22/02/2024</a:t>
             </a:fld>
             <a:endParaRPr lang="es-ES"/>
           </a:p>
@@ -3225,7 +3225,7 @@
           <a:p>
             <a:fld id="{B17FED09-996A-4092-B0CE-C688A8E76C69}" type="datetimeFigureOut">
               <a:rPr lang="es-ES" smtClean="0"/>
-              <a:t>20/02/2024</a:t>
+              <a:t>22/02/2024</a:t>
             </a:fld>
             <a:endParaRPr lang="es-ES"/>
           </a:p>
@@ -3395,7 +3395,7 @@
           <a:p>
             <a:fld id="{B17FED09-996A-4092-B0CE-C688A8E76C69}" type="datetimeFigureOut">
               <a:rPr lang="es-ES" smtClean="0"/>
-              <a:t>20/02/2024</a:t>
+              <a:t>22/02/2024</a:t>
             </a:fld>
             <a:endParaRPr lang="es-ES"/>
           </a:p>
@@ -3642,7 +3642,7 @@
           <a:p>
             <a:fld id="{B17FED09-996A-4092-B0CE-C688A8E76C69}" type="datetimeFigureOut">
               <a:rPr lang="es-ES" smtClean="0"/>
-              <a:t>20/02/2024</a:t>
+              <a:t>22/02/2024</a:t>
             </a:fld>
             <a:endParaRPr lang="es-ES"/>
           </a:p>
@@ -3934,7 +3934,7 @@
           <a:p>
             <a:fld id="{B17FED09-996A-4092-B0CE-C688A8E76C69}" type="datetimeFigureOut">
               <a:rPr lang="es-ES" smtClean="0"/>
-              <a:t>20/02/2024</a:t>
+              <a:t>22/02/2024</a:t>
             </a:fld>
             <a:endParaRPr lang="es-ES"/>
           </a:p>
@@ -4378,7 +4378,7 @@
           <a:p>
             <a:fld id="{B17FED09-996A-4092-B0CE-C688A8E76C69}" type="datetimeFigureOut">
               <a:rPr lang="es-ES" smtClean="0"/>
-              <a:t>20/02/2024</a:t>
+              <a:t>22/02/2024</a:t>
             </a:fld>
             <a:endParaRPr lang="es-ES"/>
           </a:p>
@@ -4496,7 +4496,7 @@
           <a:p>
             <a:fld id="{B17FED09-996A-4092-B0CE-C688A8E76C69}" type="datetimeFigureOut">
               <a:rPr lang="es-ES" smtClean="0"/>
-              <a:t>20/02/2024</a:t>
+              <a:t>22/02/2024</a:t>
             </a:fld>
             <a:endParaRPr lang="es-ES"/>
           </a:p>
@@ -4591,7 +4591,7 @@
           <a:p>
             <a:fld id="{B17FED09-996A-4092-B0CE-C688A8E76C69}" type="datetimeFigureOut">
               <a:rPr lang="es-ES" smtClean="0"/>
-              <a:t>20/02/2024</a:t>
+              <a:t>22/02/2024</a:t>
             </a:fld>
             <a:endParaRPr lang="es-ES"/>
           </a:p>
@@ -4870,7 +4870,7 @@
           <a:p>
             <a:fld id="{B17FED09-996A-4092-B0CE-C688A8E76C69}" type="datetimeFigureOut">
               <a:rPr lang="es-ES" smtClean="0"/>
-              <a:t>20/02/2024</a:t>
+              <a:t>22/02/2024</a:t>
             </a:fld>
             <a:endParaRPr lang="es-ES"/>
           </a:p>
@@ -5145,7 +5145,7 @@
           <a:p>
             <a:fld id="{B17FED09-996A-4092-B0CE-C688A8E76C69}" type="datetimeFigureOut">
               <a:rPr lang="es-ES" smtClean="0"/>
-              <a:t>20/02/2024</a:t>
+              <a:t>22/02/2024</a:t>
             </a:fld>
             <a:endParaRPr lang="es-ES"/>
           </a:p>
@@ -5574,7 +5574,7 @@
           <a:p>
             <a:fld id="{B17FED09-996A-4092-B0CE-C688A8E76C69}" type="datetimeFigureOut">
               <a:rPr lang="es-ES" smtClean="0"/>
-              <a:t>20/02/2024</a:t>
+              <a:t>22/02/2024</a:t>
             </a:fld>
             <a:endParaRPr lang="es-ES"/>
           </a:p>
@@ -6584,7 +6584,7 @@
         <p:spPr>
           <a:xfrm>
             <a:off x="472607" y="1273190"/>
-            <a:ext cx="11246785" cy="3477875"/>
+            <a:ext cx="11246785" cy="3785652"/>
           </a:xfrm>
           <a:prstGeom prst="rect">
             <a:avLst/>
@@ -6597,7 +6597,10 @@
           </a:bodyPr>
           <a:lstStyle/>
           <a:p>
-            <a:pPr algn="just"/>
+            <a:pPr marL="514350" indent="-514350" algn="just">
+              <a:buFont typeface="+mj-lt"/>
+              <a:buAutoNum type="romanUcPeriod"/>
+            </a:pPr>
             <a:r>
               <a:rPr lang="es-ES" sz="2000" b="0" i="0" u="none" strike="noStrike" dirty="0">
                 <a:solidFill>
@@ -6796,7 +6799,10 @@
             </a:endParaRPr>
           </a:p>
           <a:p>
-            <a:pPr algn="just"/>
+            <a:pPr marL="514350" indent="-514350" algn="just">
+              <a:buFont typeface="+mj-lt"/>
+              <a:buAutoNum type="romanUcPeriod"/>
+            </a:pPr>
             <a:r>
               <a:rPr lang="es-ES" sz="2000" b="1" i="0" u="none" strike="noStrike" dirty="0">
                 <a:solidFill>
@@ -6866,7 +6872,7 @@
         </p:nvSpPr>
         <p:spPr>
           <a:xfrm>
-            <a:off x="472607" y="4751065"/>
+            <a:off x="472607" y="4919008"/>
             <a:ext cx="11498999" cy="1938992"/>
           </a:xfrm>
           <a:prstGeom prst="rect">
@@ -6880,6 +6886,10 @@
           </a:bodyPr>
           <a:lstStyle/>
           <a:p>
+            <a:pPr marL="514350" indent="-514350">
+              <a:buFont typeface="+mj-lt"/>
+              <a:buAutoNum type="romanUcPeriod" startAt="3"/>
+            </a:pPr>
             <a:r>
               <a:rPr lang="es-ES" sz="2000" b="0" i="0" dirty="0">
                 <a:solidFill>
@@ -7035,8 +7045,8 @@
         </p:nvSpPr>
         <p:spPr>
           <a:xfrm>
-            <a:off x="590645" y="1048775"/>
-            <a:ext cx="11010707" cy="5940088"/>
+            <a:off x="590646" y="1382286"/>
+            <a:ext cx="11010707" cy="4093428"/>
           </a:xfrm>
           <a:prstGeom prst="rect">
             <a:avLst/>
@@ -7049,9 +7059,9 @@
           </a:bodyPr>
           <a:lstStyle/>
           <a:p>
-            <a:pPr marL="285750" indent="-285750">
-              <a:buFont typeface="Arial" panose="020B0604020202020204" pitchFamily="34" charset="0"/>
-              <a:buChar char="•"/>
+            <a:pPr marL="457200" indent="-457200">
+              <a:buFont typeface="+mj-lt"/>
+              <a:buAutoNum type="alphaLcParenR"/>
             </a:pPr>
             <a:r>
               <a:rPr lang="es-ES" sz="2000" dirty="0">
@@ -7063,8 +7073,6 @@
               </a:rPr>
               <a:t>El presente caso se tomará conocer el comportamiento de la demanda de laptop, toda vez que  según </a:t>
             </a:r>
-          </a:p>
-          <a:p>
             <a:r>
               <a:rPr lang="es-ES" sz="2000" dirty="0" err="1">
                 <a:solidFill>
@@ -7095,49 +7103,7 @@
                 <a:effectLst/>
                 <a:latin typeface="rubik"/>
               </a:rPr>
-              <a:t>Se pronostica que en el 2024 las ventas de PC y tabletas se retomarán, a pesar </a:t>
-            </a:r>
-          </a:p>
-          <a:p>
-            <a:r>
-              <a:rPr lang="es-ES" sz="2000" b="0" i="0" dirty="0">
-                <a:solidFill>
-                  <a:schemeClr val="tx1">
-                    <a:lumMod val="95000"/>
-                  </a:schemeClr>
-                </a:solidFill>
-                <a:effectLst/>
-                <a:latin typeface="rubik"/>
-              </a:rPr>
-              <a:t>del actual declive. Este panorama surge de un estudio llevado a cabo por IDC, una de las principales </a:t>
-            </a:r>
-          </a:p>
-          <a:p>
-            <a:r>
-              <a:rPr lang="es-ES" sz="2000" b="0" i="0" dirty="0">
-                <a:solidFill>
-                  <a:schemeClr val="tx1">
-                    <a:lumMod val="95000"/>
-                  </a:schemeClr>
-                </a:solidFill>
-                <a:effectLst/>
-                <a:latin typeface="rubik"/>
-              </a:rPr>
-              <a:t>consultoras internacionales, que establece que la comercialización de esos dispositivos bajará </a:t>
-            </a:r>
-          </a:p>
-          <a:p>
-            <a:r>
-              <a:rPr lang="es-ES" sz="2000" b="0" i="0" dirty="0">
-                <a:solidFill>
-                  <a:schemeClr val="tx1">
-                    <a:lumMod val="95000"/>
-                  </a:schemeClr>
-                </a:solidFill>
-                <a:effectLst/>
-                <a:latin typeface="rubik"/>
-              </a:rPr>
-              <a:t>casi 13% durante el pasado año 2022, hasta quedarse en unos 305 millones de unidades vendidas</a:t>
+              <a:t>Se pronostica que en el 2024 las ventas de PC y tabletas se retomarán, a pesar del actual declive. Este panorama surge de un estudio llevado a cabo por IDC, una de las principales consultoras internacionales, que establece que la comercialización de esos dispositivos bajará casi 13% durante el pasado año 2022, hasta quedarse en unos 305 millones de unidades vendidas</a:t>
             </a:r>
             <a:r>
               <a:rPr lang="es-ES" sz="2000" dirty="0">
@@ -7151,6 +7117,10 @@
             </a:r>
           </a:p>
           <a:p>
+            <a:pPr marL="457200" indent="-457200">
+              <a:buFont typeface="+mj-lt"/>
+              <a:buAutoNum type="alphaLcParenR"/>
+            </a:pPr>
             <a:r>
               <a:rPr lang="es-ES" sz="2000" b="0" i="0" dirty="0">
                 <a:solidFill>
@@ -7185,35 +7155,7 @@
                 <a:effectLst/>
                 <a:latin typeface="rubik"/>
               </a:rPr>
-              <a:t> se reduzca </a:t>
-            </a:r>
-          </a:p>
-          <a:p>
-            <a:r>
-              <a:rPr lang="es-ES" sz="2000" b="0" i="0" dirty="0">
-                <a:solidFill>
-                  <a:schemeClr val="tx1">
-                    <a:lumMod val="95000"/>
-                  </a:schemeClr>
-                </a:solidFill>
-                <a:effectLst/>
-                <a:latin typeface="rubik"/>
-              </a:rPr>
-              <a:t>cerca de un 2,5% en 2023 antes de volver a crecer en 2024, según el citado estudio. </a:t>
-            </a:r>
-          </a:p>
-          <a:p>
-            <a:r>
-              <a:rPr lang="es-ES" sz="2000" b="0" i="0" dirty="0">
-                <a:solidFill>
-                  <a:schemeClr val="tx1">
-                    <a:lumMod val="95000"/>
-                  </a:schemeClr>
-                </a:solidFill>
-                <a:effectLst/>
-                <a:latin typeface="rubik"/>
-              </a:rPr>
-              <a:t>Y las causas de la baja se atribuyen </a:t>
+              <a:t> se reduzca cerca de un 2,5% en 2023 antes de volver a crecer en 2024, según el citado estudio. Y las causas de la baja se atribuyen </a:t>
             </a:r>
             <a:r>
               <a:rPr lang="es-ES" sz="2000" b="1" i="0" dirty="0">
@@ -7225,21 +7167,7 @@
                 <a:effectLst/>
                 <a:latin typeface="rubik"/>
               </a:rPr>
-              <a:t>a la creciente inflación, a la baja en la economía mundial y </a:t>
-            </a:r>
-          </a:p>
-          <a:p>
-            <a:r>
-              <a:rPr lang="es-ES" sz="2000" b="1" i="0" dirty="0">
-                <a:solidFill>
-                  <a:schemeClr val="tx1">
-                    <a:lumMod val="95000"/>
-                  </a:schemeClr>
-                </a:solidFill>
-                <a:effectLst/>
-                <a:latin typeface="rubik"/>
-              </a:rPr>
-              <a:t>el alza de las compras durante los últimos años como consecuencia de la pandemia por coronavirus</a:t>
+              <a:t>a la creciente inflación, a la baja en la economía mundial y el alza de las compras durante los últimos años como consecuencia de la pandemia por coronavirus</a:t>
             </a:r>
             <a:r>
               <a:rPr lang="es-ES" sz="2000" b="0" i="0" dirty="0">
@@ -7262,9 +7190,9 @@
             </a:endParaRPr>
           </a:p>
           <a:p>
-            <a:pPr marL="285750" indent="-285750">
-              <a:buFont typeface="Arial" panose="020B0604020202020204" pitchFamily="34" charset="0"/>
-              <a:buChar char="•"/>
+            <a:pPr marL="457200" indent="-457200">
+              <a:buFont typeface="+mj-lt"/>
+              <a:buAutoNum type="alphaLcParenR"/>
             </a:pPr>
             <a:r>
               <a:rPr lang="es-ES" sz="2000" dirty="0">
@@ -7274,29 +7202,13 @@
                   </a:schemeClr>
                 </a:solidFill>
               </a:rPr>
-              <a:t>Con la finalidad de conocer si sigue siendo rentable este negocio. </a:t>
-            </a:r>
-          </a:p>
-          <a:p>
-            <a:pPr marL="285750" indent="-285750">
-              <a:buFont typeface="Arial" panose="020B0604020202020204" pitchFamily="34" charset="0"/>
-              <a:buChar char="•"/>
-            </a:pPr>
-            <a:r>
-              <a:rPr lang="es-ES" sz="2000" dirty="0">
-                <a:solidFill>
-                  <a:schemeClr val="tx1">
-                    <a:lumMod val="95000"/>
-                  </a:schemeClr>
-                </a:solidFill>
-              </a:rPr>
-              <a:t>O considerar el panorama que afrontara el mercado</a:t>
-            </a:r>
-          </a:p>
-          <a:p>
-            <a:pPr marL="285750" indent="-285750">
-              <a:buFont typeface="Arial" panose="020B0604020202020204" pitchFamily="34" charset="0"/>
-              <a:buChar char="•"/>
+              <a:t>Con la finalidad de conocer si sigue siendo rentable este negocio o considerar el panorama que afrontara el mercado</a:t>
+            </a:r>
+          </a:p>
+          <a:p>
+            <a:pPr marL="457200" indent="-457200">
+              <a:buFont typeface="+mj-lt"/>
+              <a:buAutoNum type="alphaLcParenR"/>
             </a:pPr>
             <a:r>
               <a:rPr lang="es-ES" sz="2000" dirty="0">
@@ -7415,21 +7327,33 @@
           </a:bodyPr>
           <a:lstStyle/>
           <a:p>
+            <a:pPr marL="342900" indent="-342900">
+              <a:buFont typeface="+mj-lt"/>
+              <a:buAutoNum type="alphaLcParenR"/>
+            </a:pPr>
             <a:r>
               <a:rPr lang="es-PE" dirty="0"/>
-              <a:t>*Lo que se desea saber es porque algunas laptops son muy caras. Esto se puede deber por la marca, mayor capacidad de la memoria RAM o el disco duro.</a:t>
-            </a:r>
-          </a:p>
-          <a:p>
+              <a:t>Lo que se desea saber es porque algunas laptops son muy caras. Esto se puede deber por la marca, mayor capacidad de la memoria RAM o el disco duro.</a:t>
+            </a:r>
+          </a:p>
+          <a:p>
+            <a:pPr marL="342900" indent="-342900">
+              <a:buFont typeface="+mj-lt"/>
+              <a:buAutoNum type="alphaLcParenR"/>
+            </a:pPr>
             <a:r>
               <a:rPr lang="es-PE" dirty="0"/>
-              <a:t>*Puede ser también el lugar donde se va a comprar debido a que tiendas como Wilson las vende baratas a diferencia de los centros comerciales.</a:t>
-            </a:r>
-          </a:p>
-          <a:p>
+              <a:t>Puede ser también el lugar donde se va a comprar debido a que tiendas como Wilson las vende baratas a diferencia de los centros comerciales.</a:t>
+            </a:r>
+          </a:p>
+          <a:p>
+            <a:pPr marL="342900" indent="-342900">
+              <a:buFont typeface="+mj-lt"/>
+              <a:buAutoNum type="alphaLcParenR"/>
+            </a:pPr>
             <a:r>
               <a:rPr lang="es-PE" dirty="0"/>
-              <a:t>*Las compras de una computadora siempre van a exceder cuando se trata de procesador, memoria RAM, tamaño de disco duro, etc.</a:t>
+              <a:t>Las compras de una computadora siempre van a exceder cuando se trata de procesador, memoria RAM, tamaño de disco duro, etc.</a:t>
             </a:r>
             <a:endParaRPr lang="es-ES" dirty="0"/>
           </a:p>
@@ -7525,7 +7449,7 @@
         </p:nvSpPr>
         <p:spPr>
           <a:xfrm>
-            <a:off x="928467" y="2253239"/>
+            <a:off x="928467" y="2548661"/>
             <a:ext cx="9286410" cy="369332"/>
           </a:xfrm>
           <a:prstGeom prst="rect">
@@ -7596,7 +7520,7 @@
         </p:nvSpPr>
         <p:spPr>
           <a:xfrm>
-            <a:off x="859861" y="1784479"/>
+            <a:off x="928467" y="1949775"/>
             <a:ext cx="9636370" cy="369332"/>
           </a:xfrm>
           <a:prstGeom prst="rect">
@@ -7936,7 +7860,7 @@
         <p:spPr>
           <a:xfrm>
             <a:off x="707922" y="1401097"/>
-            <a:ext cx="10958052" cy="4247317"/>
+            <a:ext cx="10958052" cy="4524315"/>
           </a:xfrm>
           <a:prstGeom prst="rect">
             <a:avLst/>
@@ -7949,35 +7873,51 @@
           </a:bodyPr>
           <a:lstStyle/>
           <a:p>
+            <a:pPr marL="400050" indent="-400050">
+              <a:buFont typeface="+mj-lt"/>
+              <a:buAutoNum type="romanUcPeriod"/>
+            </a:pPr>
             <a:r>
               <a:rPr lang="es-PE" dirty="0"/>
-              <a:t>*Con respecto al resultado del mapa de calor. Es una correlación directa debido a que su valor indica un 1. </a:t>
+              <a:t>El mapa de calor muestra una correlación directa debido a que su valor indica un 1.Ademas, por la tonalidad del color está más claro al dar su respuesta.</a:t>
+            </a:r>
+          </a:p>
+          <a:p>
+            <a:pPr marL="400050" indent="-400050">
+              <a:buFont typeface="+mj-lt"/>
+              <a:buAutoNum type="romanUcPeriod"/>
+            </a:pPr>
+            <a:r>
+              <a:rPr lang="es-PE" dirty="0"/>
+              <a:t>El histograma con respecto a los precios, se puede apreciar clientes prefieren compra más laptops que tengan un valor de 10000 y 30000 dólares, toda vez que su frecuencia excede de 200.</a:t>
+            </a:r>
+          </a:p>
+          <a:p>
+            <a:pPr marL="400050" indent="-400050">
+              <a:buFont typeface="+mj-lt"/>
+              <a:buAutoNum type="romanUcPeriod"/>
+            </a:pPr>
+            <a:r>
+              <a:rPr lang="es-PE" dirty="0"/>
+              <a:t>Sobre el grafico de las marcas de laptops, se muestra preferencias en las compras de las marca mas demandada , teniendo como razones la ofertas y los componentes que les puede beneficiar.</a:t>
+            </a:r>
+          </a:p>
+          <a:p>
+            <a:pPr marL="400050" indent="-400050">
+              <a:buFont typeface="+mj-lt"/>
+              <a:buAutoNum type="romanUcPeriod"/>
+            </a:pPr>
+            <a:r>
+              <a:rPr lang="es-PE" dirty="0"/>
+              <a:t>Sobre el </a:t>
             </a:r>
             <a:r>
               <a:rPr lang="es-PE" dirty="0" err="1"/>
-              <a:t>Ademas</a:t>
+              <a:t>rafico</a:t>
             </a:r>
             <a:r>
               <a:rPr lang="es-PE" dirty="0"/>
-              <a:t>, por la tonalidad del color esta mas claro al dar su respuesta.</a:t>
-            </a:r>
-          </a:p>
-          <a:p>
-            <a:r>
-              <a:rPr lang="es-PE" dirty="0"/>
-              <a:t>*En el grafico de histograma con respecto a los precios, se puede ver que la gente compra mas laptops que tengan un valor de 10000 y 30000 dólares. Esto es debido a que su frecuencia excede de 200.</a:t>
-            </a:r>
-          </a:p>
-          <a:p>
-            <a:r>
-              <a:rPr lang="es-PE" dirty="0"/>
-              <a:t>*En el grafico de las marcas de laptops, se puede ver que las personas compran mas según la marca mas demandada y esto se debe a las ofertas e incluso componentes que les puede beneficiar.</a:t>
-            </a:r>
-          </a:p>
-          <a:p>
-            <a:r>
-              <a:rPr lang="es-PE" dirty="0"/>
-              <a:t>*El grafico de precio según su memoria RAM también es importante debido a que estos son demandados debido a su rendimiento y son los mas comprados como las de 32 </a:t>
+              <a:t> de precio según su memoria RAM podemos apreciar los más demandados y ello a causa a su rendimiento, siendo el que presenta mayor frecuencia de compra el de 32 </a:t>
             </a:r>
             <a:r>
               <a:rPr lang="es-PE" dirty="0" err="1"/>
@@ -7985,13 +7925,17 @@
             </a:r>
             <a:r>
               <a:rPr lang="es-PE" dirty="0"/>
-              <a:t> con cualquier marca.</a:t>
-            </a:r>
-          </a:p>
-          <a:p>
+              <a:t> en cualquier marca.</a:t>
+            </a:r>
+          </a:p>
+          <a:p>
+            <a:pPr marL="400050" indent="-400050">
+              <a:buFont typeface="+mj-lt"/>
+              <a:buAutoNum type="romanUcPeriod"/>
+            </a:pPr>
             <a:r>
               <a:rPr lang="es-PE" dirty="0"/>
-              <a:t>*En el ultimo grafico de Brand. Se puede interpretar mas sencillo de que las personas desean tener las computadoras mas caras según su precio, disco duro de 1 </a:t>
+              <a:t>El grafico de Brand nos muestra una información sencilla pero muy efectiva puesto que se aprecia que las personas desean tener las computadoras con mayor precio, disco duro de 1 </a:t>
             </a:r>
             <a:r>
               <a:rPr lang="es-PE" dirty="0" err="1"/>
@@ -8003,9 +7947,13 @@
             </a:r>
           </a:p>
           <a:p>
+            <a:pPr marL="400050" indent="-400050">
+              <a:buFont typeface="+mj-lt"/>
+              <a:buAutoNum type="romanUcPeriod"/>
+            </a:pPr>
             <a:r>
               <a:rPr lang="es-PE" dirty="0"/>
-              <a:t>*En el caso de las pantallas de las laptops. Los usuarios prefieren que sea de marca Dell ya que estas les genera confianza.</a:t>
+              <a:t>En el caso de las pantallas de las laptops. Los usuarios prefieren que sea de marca Dell ya que estas les genera confianza.</a:t>
             </a:r>
             <a:endParaRPr lang="es-ES" dirty="0"/>
           </a:p>

</xml_diff>

<commit_message>
Agregue data y muchas graficas
</commit_message>
<xml_diff>
--- a/PROYECTO-MACHINE-LEARNING.pptx
+++ b/PROYECTO-MACHINE-LEARNING.pptx
@@ -6412,7 +6412,7 @@
         <p:spPr>
           <a:xfrm>
             <a:off x="559273" y="1501543"/>
-            <a:ext cx="4260184" cy="369332"/>
+            <a:ext cx="4260184" cy="923330"/>
           </a:xfrm>
           <a:prstGeom prst="rect">
             <a:avLst/>
@@ -6428,6 +6428,34 @@
             <a:r>
               <a:rPr lang="es-PE" dirty="0"/>
               <a:t>Librería pandas versión 2.1.4</a:t>
+            </a:r>
+          </a:p>
+          <a:p>
+            <a:r>
+              <a:rPr lang="es-PE" dirty="0"/>
+              <a:t>Librería </a:t>
+            </a:r>
+            <a:r>
+              <a:rPr lang="es-PE" dirty="0" err="1"/>
+              <a:t>seaborn</a:t>
+            </a:r>
+            <a:r>
+              <a:rPr lang="es-PE" dirty="0"/>
+              <a:t> versión 0.13.2</a:t>
+            </a:r>
+          </a:p>
+          <a:p>
+            <a:r>
+              <a:rPr lang="es-PE" dirty="0"/>
+              <a:t>Librería </a:t>
+            </a:r>
+            <a:r>
+              <a:rPr lang="es-PE" dirty="0" err="1"/>
+              <a:t>scikit-learn</a:t>
+            </a:r>
+            <a:r>
+              <a:rPr lang="es-PE" dirty="0"/>
+              <a:t> versión 1.4.0</a:t>
             </a:r>
             <a:endParaRPr lang="es-ES" dirty="0"/>
           </a:p>

</xml_diff>

<commit_message>
Espero solucinar el problema
</commit_message>
<xml_diff>
--- a/PROYECTO-MACHINE-LEARNING.pptx
+++ b/PROYECTO-MACHINE-LEARNING.pptx
@@ -334,7 +334,7 @@
           <a:p>
             <a:fld id="{B17FED09-996A-4092-B0CE-C688A8E76C69}" type="datetimeFigureOut">
               <a:rPr lang="es-ES" smtClean="0"/>
-              <a:t>03/03/2024</a:t>
+              <a:t>05/03/2024</a:t>
             </a:fld>
             <a:endParaRPr lang="es-ES"/>
           </a:p>
@@ -609,7 +609,7 @@
           <a:p>
             <a:fld id="{B17FED09-996A-4092-B0CE-C688A8E76C69}" type="datetimeFigureOut">
               <a:rPr lang="es-ES" smtClean="0"/>
-              <a:t>03/03/2024</a:t>
+              <a:t>05/03/2024</a:t>
             </a:fld>
             <a:endParaRPr lang="es-ES"/>
           </a:p>
@@ -803,7 +803,7 @@
           <a:p>
             <a:fld id="{B17FED09-996A-4092-B0CE-C688A8E76C69}" type="datetimeFigureOut">
               <a:rPr lang="es-ES" smtClean="0"/>
-              <a:t>03/03/2024</a:t>
+              <a:t>05/03/2024</a:t>
             </a:fld>
             <a:endParaRPr lang="es-ES"/>
           </a:p>
@@ -1076,7 +1076,7 @@
           <a:p>
             <a:fld id="{B17FED09-996A-4092-B0CE-C688A8E76C69}" type="datetimeFigureOut">
               <a:rPr lang="es-ES" smtClean="0"/>
-              <a:t>03/03/2024</a:t>
+              <a:t>05/03/2024</a:t>
             </a:fld>
             <a:endParaRPr lang="es-ES"/>
           </a:p>
@@ -1417,7 +1417,7 @@
           <a:p>
             <a:fld id="{B17FED09-996A-4092-B0CE-C688A8E76C69}" type="datetimeFigureOut">
               <a:rPr lang="es-ES" smtClean="0"/>
-              <a:t>03/03/2024</a:t>
+              <a:t>05/03/2024</a:t>
             </a:fld>
             <a:endParaRPr lang="es-ES"/>
           </a:p>
@@ -2040,7 +2040,7 @@
           <a:p>
             <a:fld id="{B17FED09-996A-4092-B0CE-C688A8E76C69}" type="datetimeFigureOut">
               <a:rPr lang="es-ES" smtClean="0"/>
-              <a:t>03/03/2024</a:t>
+              <a:t>05/03/2024</a:t>
             </a:fld>
             <a:endParaRPr lang="es-ES"/>
           </a:p>
@@ -2900,7 +2900,7 @@
           <a:p>
             <a:fld id="{B17FED09-996A-4092-B0CE-C688A8E76C69}" type="datetimeFigureOut">
               <a:rPr lang="es-ES" smtClean="0"/>
-              <a:t>03/03/2024</a:t>
+              <a:t>05/03/2024</a:t>
             </a:fld>
             <a:endParaRPr lang="es-ES"/>
           </a:p>
@@ -3070,7 +3070,7 @@
           <a:p>
             <a:fld id="{B17FED09-996A-4092-B0CE-C688A8E76C69}" type="datetimeFigureOut">
               <a:rPr lang="es-ES" smtClean="0"/>
-              <a:t>03/03/2024</a:t>
+              <a:t>05/03/2024</a:t>
             </a:fld>
             <a:endParaRPr lang="es-ES"/>
           </a:p>
@@ -3250,7 +3250,7 @@
           <a:p>
             <a:fld id="{B17FED09-996A-4092-B0CE-C688A8E76C69}" type="datetimeFigureOut">
               <a:rPr lang="es-ES" smtClean="0"/>
-              <a:t>03/03/2024</a:t>
+              <a:t>05/03/2024</a:t>
             </a:fld>
             <a:endParaRPr lang="es-ES"/>
           </a:p>
@@ -3420,7 +3420,7 @@
           <a:p>
             <a:fld id="{B17FED09-996A-4092-B0CE-C688A8E76C69}" type="datetimeFigureOut">
               <a:rPr lang="es-ES" smtClean="0"/>
-              <a:t>03/03/2024</a:t>
+              <a:t>05/03/2024</a:t>
             </a:fld>
             <a:endParaRPr lang="es-ES"/>
           </a:p>
@@ -3667,7 +3667,7 @@
           <a:p>
             <a:fld id="{B17FED09-996A-4092-B0CE-C688A8E76C69}" type="datetimeFigureOut">
               <a:rPr lang="es-ES" smtClean="0"/>
-              <a:t>03/03/2024</a:t>
+              <a:t>05/03/2024</a:t>
             </a:fld>
             <a:endParaRPr lang="es-ES"/>
           </a:p>
@@ -3959,7 +3959,7 @@
           <a:p>
             <a:fld id="{B17FED09-996A-4092-B0CE-C688A8E76C69}" type="datetimeFigureOut">
               <a:rPr lang="es-ES" smtClean="0"/>
-              <a:t>03/03/2024</a:t>
+              <a:t>05/03/2024</a:t>
             </a:fld>
             <a:endParaRPr lang="es-ES"/>
           </a:p>
@@ -4403,7 +4403,7 @@
           <a:p>
             <a:fld id="{B17FED09-996A-4092-B0CE-C688A8E76C69}" type="datetimeFigureOut">
               <a:rPr lang="es-ES" smtClean="0"/>
-              <a:t>03/03/2024</a:t>
+              <a:t>05/03/2024</a:t>
             </a:fld>
             <a:endParaRPr lang="es-ES"/>
           </a:p>
@@ -4521,7 +4521,7 @@
           <a:p>
             <a:fld id="{B17FED09-996A-4092-B0CE-C688A8E76C69}" type="datetimeFigureOut">
               <a:rPr lang="es-ES" smtClean="0"/>
-              <a:t>03/03/2024</a:t>
+              <a:t>05/03/2024</a:t>
             </a:fld>
             <a:endParaRPr lang="es-ES"/>
           </a:p>
@@ -4616,7 +4616,7 @@
           <a:p>
             <a:fld id="{B17FED09-996A-4092-B0CE-C688A8E76C69}" type="datetimeFigureOut">
               <a:rPr lang="es-ES" smtClean="0"/>
-              <a:t>03/03/2024</a:t>
+              <a:t>05/03/2024</a:t>
             </a:fld>
             <a:endParaRPr lang="es-ES"/>
           </a:p>
@@ -4895,7 +4895,7 @@
           <a:p>
             <a:fld id="{B17FED09-996A-4092-B0CE-C688A8E76C69}" type="datetimeFigureOut">
               <a:rPr lang="es-ES" smtClean="0"/>
-              <a:t>03/03/2024</a:t>
+              <a:t>05/03/2024</a:t>
             </a:fld>
             <a:endParaRPr lang="es-ES"/>
           </a:p>
@@ -5170,7 +5170,7 @@
           <a:p>
             <a:fld id="{B17FED09-996A-4092-B0CE-C688A8E76C69}" type="datetimeFigureOut">
               <a:rPr lang="es-ES" smtClean="0"/>
-              <a:t>03/03/2024</a:t>
+              <a:t>05/03/2024</a:t>
             </a:fld>
             <a:endParaRPr lang="es-ES"/>
           </a:p>
@@ -5599,7 +5599,7 @@
           <a:p>
             <a:fld id="{B17FED09-996A-4092-B0CE-C688A8E76C69}" type="datetimeFigureOut">
               <a:rPr lang="es-ES" smtClean="0"/>
-              <a:t>03/03/2024</a:t>
+              <a:t>05/03/2024</a:t>
             </a:fld>
             <a:endParaRPr lang="es-ES"/>
           </a:p>

</xml_diff>